<commit_message>
Add ground station TM and bluetooth
Add ground station interface with rf25LO1 telemetry and bluetooth
</commit_message>
<xml_diff>
--- a/Simulation Outline.pptx
+++ b/Simulation Outline.pptx
@@ -56,6 +56,8 @@
     <p:sldId id="303" r:id="rId50"/>
     <p:sldId id="304" r:id="rId51"/>
     <p:sldId id="305" r:id="rId52"/>
+    <p:sldId id="311" r:id="rId53"/>
+    <p:sldId id="312" r:id="rId54"/>
   </p:sldIdLst>
   <p:sldSz cx="9144000" cy="6858000" type="screen4x3"/>
   <p:notesSz cx="6858000" cy="9144000"/>
@@ -338,7 +340,7 @@
           <a:p>
             <a:fld id="{C3FDBE07-93C4-1244-B5BB-C293211E703B}" type="datetimeFigureOut">
               <a:rPr lang="en-US" smtClean="0"/>
-              <a:t>12/4/22</a:t>
+              <a:t>12/29/22</a:t>
             </a:fld>
             <a:endParaRPr lang="en-US"/>
           </a:p>
@@ -508,7 +510,7 @@
           <a:p>
             <a:fld id="{C3FDBE07-93C4-1244-B5BB-C293211E703B}" type="datetimeFigureOut">
               <a:rPr lang="en-US" smtClean="0"/>
-              <a:t>12/4/22</a:t>
+              <a:t>12/29/22</a:t>
             </a:fld>
             <a:endParaRPr lang="en-US"/>
           </a:p>
@@ -688,7 +690,7 @@
           <a:p>
             <a:fld id="{C3FDBE07-93C4-1244-B5BB-C293211E703B}" type="datetimeFigureOut">
               <a:rPr lang="en-US" smtClean="0"/>
-              <a:t>12/4/22</a:t>
+              <a:t>12/29/22</a:t>
             </a:fld>
             <a:endParaRPr lang="en-US"/>
           </a:p>
@@ -858,7 +860,7 @@
           <a:p>
             <a:fld id="{C3FDBE07-93C4-1244-B5BB-C293211E703B}" type="datetimeFigureOut">
               <a:rPr lang="en-US" smtClean="0"/>
-              <a:t>12/4/22</a:t>
+              <a:t>12/29/22</a:t>
             </a:fld>
             <a:endParaRPr lang="en-US"/>
           </a:p>
@@ -1104,7 +1106,7 @@
           <a:p>
             <a:fld id="{C3FDBE07-93C4-1244-B5BB-C293211E703B}" type="datetimeFigureOut">
               <a:rPr lang="en-US" smtClean="0"/>
-              <a:t>12/4/22</a:t>
+              <a:t>12/29/22</a:t>
             </a:fld>
             <a:endParaRPr lang="en-US"/>
           </a:p>
@@ -1392,7 +1394,7 @@
           <a:p>
             <a:fld id="{C3FDBE07-93C4-1244-B5BB-C293211E703B}" type="datetimeFigureOut">
               <a:rPr lang="en-US" smtClean="0"/>
-              <a:t>12/4/22</a:t>
+              <a:t>12/29/22</a:t>
             </a:fld>
             <a:endParaRPr lang="en-US"/>
           </a:p>
@@ -1814,7 +1816,7 @@
           <a:p>
             <a:fld id="{C3FDBE07-93C4-1244-B5BB-C293211E703B}" type="datetimeFigureOut">
               <a:rPr lang="en-US" smtClean="0"/>
-              <a:t>12/4/22</a:t>
+              <a:t>12/29/22</a:t>
             </a:fld>
             <a:endParaRPr lang="en-US"/>
           </a:p>
@@ -1932,7 +1934,7 @@
           <a:p>
             <a:fld id="{C3FDBE07-93C4-1244-B5BB-C293211E703B}" type="datetimeFigureOut">
               <a:rPr lang="en-US" smtClean="0"/>
-              <a:t>12/4/22</a:t>
+              <a:t>12/29/22</a:t>
             </a:fld>
             <a:endParaRPr lang="en-US"/>
           </a:p>
@@ -2027,7 +2029,7 @@
           <a:p>
             <a:fld id="{C3FDBE07-93C4-1244-B5BB-C293211E703B}" type="datetimeFigureOut">
               <a:rPr lang="en-US" smtClean="0"/>
-              <a:t>12/4/22</a:t>
+              <a:t>12/29/22</a:t>
             </a:fld>
             <a:endParaRPr lang="en-US"/>
           </a:p>
@@ -2304,7 +2306,7 @@
           <a:p>
             <a:fld id="{C3FDBE07-93C4-1244-B5BB-C293211E703B}" type="datetimeFigureOut">
               <a:rPr lang="en-US" smtClean="0"/>
-              <a:t>12/4/22</a:t>
+              <a:t>12/29/22</a:t>
             </a:fld>
             <a:endParaRPr lang="en-US"/>
           </a:p>
@@ -2557,7 +2559,7 @@
           <a:p>
             <a:fld id="{C3FDBE07-93C4-1244-B5BB-C293211E703B}" type="datetimeFigureOut">
               <a:rPr lang="en-US" smtClean="0"/>
-              <a:t>12/4/22</a:t>
+              <a:t>12/29/22</a:t>
             </a:fld>
             <a:endParaRPr lang="en-US"/>
           </a:p>
@@ -2770,7 +2772,7 @@
           <a:p>
             <a:fld id="{C3FDBE07-93C4-1244-B5BB-C293211E703B}" type="datetimeFigureOut">
               <a:rPr lang="en-US" smtClean="0"/>
-              <a:t>12/4/22</a:t>
+              <a:t>12/29/22</a:t>
             </a:fld>
             <a:endParaRPr lang="en-US"/>
           </a:p>
@@ -20476,11 +20478,7 @@
           <a:p>
             <a:r>
               <a:rPr lang="en-US" dirty="0" smtClean="0"/>
-              <a:t>P </a:t>
-            </a:r>
-            <a:r>
-              <a:rPr lang="en-US" dirty="0" smtClean="0"/>
-              <a:t>Controller</a:t>
+              <a:t>P Controller</a:t>
             </a:r>
             <a:endParaRPr lang="en-US" dirty="0"/>
           </a:p>
@@ -21494,11 +21492,7 @@
             </a:r>
             <a:r>
               <a:rPr lang="en-US" dirty="0" smtClean="0"/>
-              <a:t> </a:t>
-            </a:r>
-            <a:r>
-              <a:rPr lang="en-US" dirty="0" smtClean="0"/>
-              <a:t>Outer Pitch Loop</a:t>
+              <a:t> Outer Pitch Loop</a:t>
             </a:r>
             <a:endParaRPr lang="en-US" dirty="0"/>
           </a:p>
@@ -21634,11 +21628,7 @@
           <a:p>
             <a:r>
               <a:rPr lang="en-US" dirty="0" smtClean="0"/>
-              <a:t>PI </a:t>
-            </a:r>
-            <a:r>
-              <a:rPr lang="en-US" dirty="0" smtClean="0"/>
-              <a:t>Controller</a:t>
+              <a:t>PI Controller</a:t>
             </a:r>
             <a:endParaRPr lang="en-US" dirty="0"/>
           </a:p>
@@ -22710,11 +22700,7 @@
             </a:r>
             <a:r>
               <a:rPr lang="en-US" dirty="0" smtClean="0"/>
-              <a:t> </a:t>
-            </a:r>
-            <a:r>
-              <a:rPr lang="en-US" dirty="0" smtClean="0"/>
-              <a:t>Outer Loop Response</a:t>
+              <a:t> Outer Loop Response</a:t>
             </a:r>
             <a:endParaRPr lang="en-US" dirty="0"/>
           </a:p>
@@ -23192,11 +23178,7 @@
             </a:r>
             <a:r>
               <a:rPr lang="en-US" dirty="0" smtClean="0"/>
-              <a:t> PI Outer </a:t>
-            </a:r>
-            <a:r>
-              <a:rPr lang="en-US" dirty="0" smtClean="0"/>
-              <a:t>Pitch Loop</a:t>
+              <a:t> PI Outer Pitch Loop</a:t>
             </a:r>
             <a:endParaRPr lang="en-US" dirty="0"/>
           </a:p>
@@ -23332,11 +23314,7 @@
           <a:p>
             <a:r>
               <a:rPr lang="en-US" dirty="0" smtClean="0"/>
-              <a:t>PI </a:t>
-            </a:r>
-            <a:r>
-              <a:rPr lang="en-US" dirty="0" smtClean="0"/>
-              <a:t>Controller</a:t>
+              <a:t>PI Controller</a:t>
             </a:r>
             <a:endParaRPr lang="en-US" dirty="0"/>
           </a:p>
@@ -23374,11 +23352,7 @@
             </a:r>
             <a:r>
               <a:rPr lang="en-US" dirty="0" smtClean="0"/>
-              <a:t>(s) = </a:t>
-            </a:r>
-            <a:r>
-              <a:rPr lang="en-US" dirty="0" smtClean="0"/>
-              <a:t>(</a:t>
+              <a:t>(s) = (</a:t>
             </a:r>
             <a:r>
               <a:rPr lang="en-US" dirty="0" err="1" smtClean="0"/>
@@ -23511,19 +23485,11 @@
             </a:r>
             <a:r>
               <a:rPr lang="en-US" dirty="0" smtClean="0"/>
-              <a:t>/</a:t>
-            </a:r>
-            <a:r>
-              <a:rPr lang="en-US" dirty="0" smtClean="0"/>
-              <a:t>s + </a:t>
-            </a:r>
-            <a:r>
-              <a:rPr lang="en-US" dirty="0" err="1" smtClean="0"/>
-              <a:t>ki</a:t>
-            </a:r>
-            <a:r>
-              <a:rPr lang="en-US" dirty="0" err="1" smtClean="0"/>
-              <a:t>K</a:t>
+              <a:t>/s + </a:t>
+            </a:r>
+            <a:r>
+              <a:rPr lang="en-US" dirty="0" err="1" smtClean="0"/>
+              <a:t>kiK</a:t>
             </a:r>
             <a:r>
               <a:rPr lang="en-US" baseline="-25000" dirty="0" err="1" smtClean="0"/>
@@ -23574,19 +23540,11 @@
             </a:r>
             <a:r>
               <a:rPr lang="en-US" dirty="0"/>
-              <a:t>= </a:t>
-            </a:r>
-            <a:r>
-              <a:rPr lang="en-US" dirty="0"/>
-              <a:t>(</a:t>
-            </a:r>
-            <a:r>
-              <a:rPr lang="en-US" dirty="0" err="1" smtClean="0"/>
-              <a:t>kp</a:t>
-            </a:r>
-            <a:r>
-              <a:rPr lang="en-US" dirty="0" err="1" smtClean="0"/>
-              <a:t>K</a:t>
+              <a:t>= (</a:t>
+            </a:r>
+            <a:r>
+              <a:rPr lang="en-US" dirty="0" err="1" smtClean="0"/>
+              <a:t>kpK</a:t>
             </a:r>
             <a:r>
               <a:rPr lang="en-US" baseline="-25000" dirty="0" err="1" smtClean="0"/>
@@ -23614,19 +23572,7 @@
             </a:r>
             <a:r>
               <a:rPr lang="en-US" dirty="0" smtClean="0"/>
-              <a:t>)</a:t>
-            </a:r>
-            <a:r>
-              <a:rPr lang="en-US" dirty="0" smtClean="0"/>
-              <a:t>/ </a:t>
-            </a:r>
-            <a:r>
-              <a:rPr lang="en-US" dirty="0" smtClean="0"/>
-              <a:t>(</a:t>
-            </a:r>
-            <a:r>
-              <a:rPr lang="en-US" dirty="0" smtClean="0"/>
-              <a:t>s</a:t>
+              <a:t>)/ (s</a:t>
             </a:r>
             <a:r>
               <a:rPr lang="en-US" baseline="30000" dirty="0" smtClean="0"/>
@@ -23656,7 +23602,6 @@
               <a:rPr lang="en-US" dirty="0" smtClean="0"/>
               <a:t>)</a:t>
             </a:r>
-            <a:endParaRPr lang="en-US" dirty="0" smtClean="0"/>
           </a:p>
         </p:txBody>
       </p:sp>
@@ -23710,11 +23655,7 @@
             </a:r>
             <a:r>
               <a:rPr lang="en-US" dirty="0"/>
-              <a:t>(s)/(1+G(s)) </a:t>
-            </a:r>
-            <a:r>
-              <a:rPr lang="en-US" dirty="0"/>
-              <a:t>=</a:t>
+              <a:t>(s)/(1+G(s)) =</a:t>
             </a:r>
             <a:r>
               <a:rPr lang="en-US" dirty="0" err="1"/>
@@ -23776,15 +23717,7 @@
             </a:r>
             <a:r>
               <a:rPr lang="en-US" dirty="0" smtClean="0"/>
-              <a:t>impulse, step inputs</a:t>
-            </a:r>
-            <a:r>
-              <a:rPr lang="en-US" dirty="0" smtClean="0"/>
-              <a:t>, and </a:t>
-            </a:r>
-            <a:r>
-              <a:rPr lang="en-US" dirty="0" smtClean="0"/>
-              <a:t>ramp </a:t>
+              <a:t>impulse, step inputs, and ramp </a:t>
             </a:r>
             <a:r>
               <a:rPr lang="en-US" dirty="0"/>
@@ -24538,11 +24471,7 @@
             </a:r>
             <a:r>
               <a:rPr lang="en-US" dirty="0" smtClean="0"/>
-              <a:t> PI Outer </a:t>
-            </a:r>
-            <a:r>
-              <a:rPr lang="en-US" dirty="0" smtClean="0"/>
-              <a:t>Loop Response</a:t>
+              <a:t> PI Outer Loop Response</a:t>
             </a:r>
             <a:endParaRPr lang="en-US" dirty="0"/>
           </a:p>
@@ -26523,11 +26452,7 @@
             </a:r>
             <a:r>
               <a:rPr lang="en-US" dirty="0" smtClean="0"/>
-              <a:t> </a:t>
-            </a:r>
-            <a:r>
-              <a:rPr lang="en-US" dirty="0" smtClean="0"/>
-              <a:t>PI Control Loop</a:t>
+              <a:t> PI Control Loop</a:t>
             </a:r>
             <a:endParaRPr lang="en-US" dirty="0"/>
           </a:p>
@@ -29625,7 +29550,7 @@
           <a:graphicData uri="http://schemas.openxmlformats.org/presentationml/2006/ole">
             <mc:AlternateContent xmlns:mc="http://schemas.openxmlformats.org/markup-compatibility/2006">
               <mc:Choice xmlns:v="urn:schemas-microsoft-com:vml" Requires="v">
-                <p:oleObj spid="_x0000_s1192" name="Equation" r:id="rId3" imgW="1714500" imgH="1638300" progId="Equation.3">
+                <p:oleObj spid="_x0000_s1208" name="Equation" r:id="rId3" imgW="1714500" imgH="1638300" progId="Equation.3">
                   <p:embed/>
                 </p:oleObj>
               </mc:Choice>
@@ -29682,7 +29607,7 @@
           <a:graphicData uri="http://schemas.openxmlformats.org/presentationml/2006/ole">
             <mc:AlternateContent xmlns:mc="http://schemas.openxmlformats.org/markup-compatibility/2006">
               <mc:Choice xmlns:v="urn:schemas-microsoft-com:vml" Requires="v">
-                <p:oleObj spid="_x0000_s1193" name="Equation" r:id="rId5" imgW="2044700" imgH="292100" progId="Equation.3">
+                <p:oleObj spid="_x0000_s1209" name="Equation" r:id="rId5" imgW="2044700" imgH="292100" progId="Equation.3">
                   <p:embed/>
                 </p:oleObj>
               </mc:Choice>
@@ -31688,7 +31613,13 @@
           <a:p>
             <a:r>
               <a:rPr lang="en-US" dirty="0" smtClean="0"/>
-              <a:t>Supply drone with </a:t>
+              <a:t>Drone has telemetry receiver (and RC receiver)</a:t>
+            </a:r>
+          </a:p>
+          <a:p>
+            <a:r>
+              <a:rPr lang="en-US" dirty="0" smtClean="0"/>
+              <a:t>Ground station has </a:t>
             </a:r>
             <a:r>
               <a:rPr lang="en-US" dirty="0" err="1" smtClean="0"/>
@@ -31696,15 +31627,33 @@
             </a:r>
             <a:r>
               <a:rPr lang="en-US" dirty="0" smtClean="0"/>
-              <a:t> and </a:t>
+              <a:t> and transmitter</a:t>
+            </a:r>
+          </a:p>
+          <a:p>
+            <a:pPr lvl="1"/>
+            <a:r>
+              <a:rPr lang="en-US" dirty="0" smtClean="0"/>
+              <a:t>Future: use as RC transmitter also</a:t>
+            </a:r>
+          </a:p>
+          <a:p>
+            <a:r>
+              <a:rPr lang="en-US" dirty="0" smtClean="0"/>
+              <a:t>Computer/iPhone app connects to ground station through </a:t>
+            </a:r>
+            <a:r>
+              <a:rPr lang="en-US" dirty="0" err="1" smtClean="0"/>
+              <a:t>bluetooth</a:t>
             </a:r>
             <a:r>
               <a:rPr lang="en-US" smtClean="0"/>
-              <a:t>telemetry kit</a:t>
-            </a:r>
-          </a:p>
-          <a:p>
-            <a:endParaRPr lang="en-US"/>
+              <a:t>.</a:t>
+            </a:r>
+            <a:endParaRPr lang="en-US" dirty="0" smtClean="0"/>
+          </a:p>
+          <a:p>
+            <a:endParaRPr lang="en-US" dirty="0"/>
           </a:p>
         </p:txBody>
       </p:sp>
@@ -31712,6 +31661,295 @@
     <p:extLst>
       <p:ext uri="{BB962C8B-B14F-4D97-AF65-F5344CB8AC3E}">
         <p14:creationId xmlns:p14="http://schemas.microsoft.com/office/powerpoint/2010/main" val="891112083"/>
+      </p:ext>
+    </p:extLst>
+  </p:cSld>
+  <p:clrMapOvr>
+    <a:masterClrMapping/>
+  </p:clrMapOvr>
+</p:sld>
+</file>
+
+<file path=ppt/slides/slide52.xml><?xml version="1.0" encoding="utf-8"?>
+<p:sld xmlns:a="http://schemas.openxmlformats.org/drawingml/2006/main" xmlns:r="http://schemas.openxmlformats.org/officeDocument/2006/relationships" xmlns:p="http://schemas.openxmlformats.org/presentationml/2006/main">
+  <p:cSld>
+    <p:spTree>
+      <p:nvGrpSpPr>
+        <p:cNvPr id="1" name=""/>
+        <p:cNvGrpSpPr/>
+        <p:nvPr/>
+      </p:nvGrpSpPr>
+      <p:grpSpPr>
+        <a:xfrm>
+          <a:off x="0" y="0"/>
+          <a:ext cx="0" cy="0"/>
+          <a:chOff x="0" y="0"/>
+          <a:chExt cx="0" cy="0"/>
+        </a:xfrm>
+      </p:grpSpPr>
+      <p:sp>
+        <p:nvSpPr>
+          <p:cNvPr id="2" name="Title 1"/>
+          <p:cNvSpPr>
+            <a:spLocks noGrp="1"/>
+          </p:cNvSpPr>
+          <p:nvPr>
+            <p:ph type="title"/>
+          </p:nvPr>
+        </p:nvSpPr>
+        <p:spPr/>
+        <p:txBody>
+          <a:bodyPr/>
+          <a:lstStyle/>
+          <a:p>
+            <a:r>
+              <a:rPr lang="en-US" dirty="0" err="1" smtClean="0"/>
+              <a:t>Arduino</a:t>
+            </a:r>
+            <a:r>
+              <a:rPr lang="en-US" dirty="0" smtClean="0"/>
+              <a:t> Nano SPI</a:t>
+            </a:r>
+            <a:endParaRPr lang="en-US" dirty="0"/>
+          </a:p>
+        </p:txBody>
+      </p:sp>
+      <p:sp>
+        <p:nvSpPr>
+          <p:cNvPr id="3" name="Content Placeholder 2"/>
+          <p:cNvSpPr>
+            <a:spLocks noGrp="1"/>
+          </p:cNvSpPr>
+          <p:nvPr>
+            <p:ph idx="1"/>
+          </p:nvPr>
+        </p:nvSpPr>
+        <p:spPr/>
+        <p:txBody>
+          <a:bodyPr/>
+          <a:lstStyle/>
+          <a:p>
+            <a:r>
+              <a:rPr lang="en-US" dirty="0" smtClean="0"/>
+              <a:t>MISO </a:t>
+            </a:r>
+            <a:r>
+              <a:rPr lang="mr-IN" dirty="0" smtClean="0"/>
+              <a:t>–</a:t>
+            </a:r>
+            <a:r>
+              <a:rPr lang="en-US" dirty="0" smtClean="0"/>
+              <a:t> 12</a:t>
+            </a:r>
+          </a:p>
+          <a:p>
+            <a:r>
+              <a:rPr lang="en-US" dirty="0" smtClean="0"/>
+              <a:t>MOSI </a:t>
+            </a:r>
+            <a:r>
+              <a:rPr lang="mr-IN" dirty="0" smtClean="0"/>
+              <a:t>–</a:t>
+            </a:r>
+            <a:r>
+              <a:rPr lang="en-US" dirty="0" smtClean="0"/>
+              <a:t> 11</a:t>
+            </a:r>
+          </a:p>
+          <a:p>
+            <a:r>
+              <a:rPr lang="en-US" dirty="0" smtClean="0"/>
+              <a:t>SCK </a:t>
+            </a:r>
+            <a:r>
+              <a:rPr lang="mr-IN" dirty="0" smtClean="0"/>
+              <a:t>–</a:t>
+            </a:r>
+            <a:r>
+              <a:rPr lang="en-US" dirty="0" smtClean="0"/>
+              <a:t> 13</a:t>
+            </a:r>
+          </a:p>
+          <a:p>
+            <a:r>
+              <a:rPr lang="en-US" dirty="0" smtClean="0"/>
+              <a:t>CE </a:t>
+            </a:r>
+            <a:r>
+              <a:rPr lang="mr-IN" dirty="0" smtClean="0"/>
+              <a:t>–</a:t>
+            </a:r>
+            <a:r>
+              <a:rPr lang="en-US" dirty="0" smtClean="0"/>
+              <a:t> 9</a:t>
+            </a:r>
+          </a:p>
+          <a:p>
+            <a:r>
+              <a:rPr lang="en-US" dirty="0" smtClean="0"/>
+              <a:t>CSN </a:t>
+            </a:r>
+            <a:r>
+              <a:rPr lang="mr-IN" dirty="0" smtClean="0"/>
+              <a:t>–</a:t>
+            </a:r>
+            <a:r>
+              <a:rPr lang="en-US" dirty="0" smtClean="0"/>
+              <a:t> 10</a:t>
+            </a:r>
+          </a:p>
+          <a:p>
+            <a:endParaRPr lang="en-US" dirty="0"/>
+          </a:p>
+        </p:txBody>
+      </p:sp>
+    </p:spTree>
+    <p:extLst>
+      <p:ext uri="{BB962C8B-B14F-4D97-AF65-F5344CB8AC3E}">
+        <p14:creationId xmlns:p14="http://schemas.microsoft.com/office/powerpoint/2010/main" val="1234539895"/>
+      </p:ext>
+    </p:extLst>
+  </p:cSld>
+  <p:clrMapOvr>
+    <a:masterClrMapping/>
+  </p:clrMapOvr>
+</p:sld>
+</file>
+
+<file path=ppt/slides/slide53.xml><?xml version="1.0" encoding="utf-8"?>
+<p:sld xmlns:a="http://schemas.openxmlformats.org/drawingml/2006/main" xmlns:r="http://schemas.openxmlformats.org/officeDocument/2006/relationships" xmlns:p="http://schemas.openxmlformats.org/presentationml/2006/main">
+  <p:cSld>
+    <p:spTree>
+      <p:nvGrpSpPr>
+        <p:cNvPr id="1" name=""/>
+        <p:cNvGrpSpPr/>
+        <p:nvPr/>
+      </p:nvGrpSpPr>
+      <p:grpSpPr>
+        <a:xfrm>
+          <a:off x="0" y="0"/>
+          <a:ext cx="0" cy="0"/>
+          <a:chOff x="0" y="0"/>
+          <a:chExt cx="0" cy="0"/>
+        </a:xfrm>
+      </p:grpSpPr>
+      <p:sp>
+        <p:nvSpPr>
+          <p:cNvPr id="2" name="Title 1"/>
+          <p:cNvSpPr>
+            <a:spLocks noGrp="1"/>
+          </p:cNvSpPr>
+          <p:nvPr>
+            <p:ph type="title"/>
+          </p:nvPr>
+        </p:nvSpPr>
+        <p:spPr/>
+        <p:txBody>
+          <a:bodyPr/>
+          <a:lstStyle/>
+          <a:p>
+            <a:r>
+              <a:rPr lang="en-US" dirty="0" smtClean="0"/>
+              <a:t>Teensy 4.0 SPI</a:t>
+            </a:r>
+            <a:endParaRPr lang="en-US" dirty="0"/>
+          </a:p>
+        </p:txBody>
+      </p:sp>
+      <p:sp>
+        <p:nvSpPr>
+          <p:cNvPr id="3" name="Content Placeholder 2"/>
+          <p:cNvSpPr>
+            <a:spLocks noGrp="1"/>
+          </p:cNvSpPr>
+          <p:nvPr>
+            <p:ph idx="1"/>
+          </p:nvPr>
+        </p:nvSpPr>
+        <p:spPr/>
+        <p:txBody>
+          <a:bodyPr/>
+          <a:lstStyle/>
+          <a:p>
+            <a:r>
+              <a:rPr lang="en-US" dirty="0" smtClean="0"/>
+              <a:t>MISO </a:t>
+            </a:r>
+            <a:r>
+              <a:rPr lang="mr-IN" dirty="0" smtClean="0"/>
+              <a:t>–</a:t>
+            </a:r>
+            <a:r>
+              <a:rPr lang="en-US" dirty="0" smtClean="0"/>
+              <a:t> 12</a:t>
+            </a:r>
+          </a:p>
+          <a:p>
+            <a:r>
+              <a:rPr lang="en-US" dirty="0" smtClean="0"/>
+              <a:t>MOSI </a:t>
+            </a:r>
+            <a:r>
+              <a:rPr lang="mr-IN" dirty="0" smtClean="0"/>
+              <a:t>–</a:t>
+            </a:r>
+            <a:r>
+              <a:rPr lang="en-US" dirty="0" smtClean="0"/>
+              <a:t> 11</a:t>
+            </a:r>
+          </a:p>
+          <a:p>
+            <a:r>
+              <a:rPr lang="en-US" dirty="0" smtClean="0"/>
+              <a:t>SCK </a:t>
+            </a:r>
+            <a:r>
+              <a:rPr lang="mr-IN" dirty="0" smtClean="0"/>
+              <a:t>–</a:t>
+            </a:r>
+            <a:r>
+              <a:rPr lang="en-US" dirty="0" smtClean="0"/>
+              <a:t> 13</a:t>
+            </a:r>
+          </a:p>
+          <a:p>
+            <a:r>
+              <a:rPr lang="en-US" dirty="0" smtClean="0"/>
+              <a:t>CE </a:t>
+            </a:r>
+            <a:r>
+              <a:rPr lang="mr-IN" dirty="0" smtClean="0"/>
+              <a:t>–</a:t>
+            </a:r>
+            <a:r>
+              <a:rPr lang="en-US" smtClean="0"/>
+              <a:t>  (4)</a:t>
+            </a:r>
+            <a:endParaRPr lang="en-US" dirty="0" smtClean="0"/>
+          </a:p>
+          <a:p>
+            <a:r>
+              <a:rPr lang="en-US" dirty="0" smtClean="0"/>
+              <a:t>CSN </a:t>
+            </a:r>
+            <a:r>
+              <a:rPr lang="mr-IN" dirty="0" smtClean="0"/>
+              <a:t>–</a:t>
+            </a:r>
+            <a:r>
+              <a:rPr lang="en-US" dirty="0" smtClean="0"/>
+              <a:t> (2)</a:t>
+            </a:r>
+          </a:p>
+          <a:p>
+            <a:endParaRPr lang="en-US" dirty="0"/>
+          </a:p>
+        </p:txBody>
+      </p:sp>
+    </p:spTree>
+    <p:extLst>
+      <p:ext uri="{BB962C8B-B14F-4D97-AF65-F5344CB8AC3E}">
+        <p14:creationId xmlns:p14="http://schemas.microsoft.com/office/powerpoint/2010/main" val="3389540702"/>
       </p:ext>
     </p:extLst>
   </p:cSld>

</xml_diff>

<commit_message>
Update for APC220 telemetry
Update serial for APC220 telemetry. Add ground align for navigation filter. Bugfix segfaults in serial modeling
</commit_message>
<xml_diff>
--- a/Simulation Outline.pptx
+++ b/Simulation Outline.pptx
@@ -53,11 +53,13 @@
     <p:sldId id="301" r:id="rId47"/>
     <p:sldId id="302" r:id="rId48"/>
     <p:sldId id="306" r:id="rId49"/>
-    <p:sldId id="303" r:id="rId50"/>
-    <p:sldId id="304" r:id="rId51"/>
-    <p:sldId id="305" r:id="rId52"/>
-    <p:sldId id="311" r:id="rId53"/>
-    <p:sldId id="312" r:id="rId54"/>
+    <p:sldId id="314" r:id="rId50"/>
+    <p:sldId id="313" r:id="rId51"/>
+    <p:sldId id="303" r:id="rId52"/>
+    <p:sldId id="304" r:id="rId53"/>
+    <p:sldId id="305" r:id="rId54"/>
+    <p:sldId id="311" r:id="rId55"/>
+    <p:sldId id="312" r:id="rId56"/>
   </p:sldIdLst>
   <p:sldSz cx="9144000" cy="6858000" type="screen4x3"/>
   <p:notesSz cx="6858000" cy="9144000"/>
@@ -340,7 +342,7 @@
           <a:p>
             <a:fld id="{C3FDBE07-93C4-1244-B5BB-C293211E703B}" type="datetimeFigureOut">
               <a:rPr lang="en-US" smtClean="0"/>
-              <a:t>12/29/22</a:t>
+              <a:t>2/18/23</a:t>
             </a:fld>
             <a:endParaRPr lang="en-US"/>
           </a:p>
@@ -510,7 +512,7 @@
           <a:p>
             <a:fld id="{C3FDBE07-93C4-1244-B5BB-C293211E703B}" type="datetimeFigureOut">
               <a:rPr lang="en-US" smtClean="0"/>
-              <a:t>12/29/22</a:t>
+              <a:t>2/18/23</a:t>
             </a:fld>
             <a:endParaRPr lang="en-US"/>
           </a:p>
@@ -690,7 +692,7 @@
           <a:p>
             <a:fld id="{C3FDBE07-93C4-1244-B5BB-C293211E703B}" type="datetimeFigureOut">
               <a:rPr lang="en-US" smtClean="0"/>
-              <a:t>12/29/22</a:t>
+              <a:t>2/18/23</a:t>
             </a:fld>
             <a:endParaRPr lang="en-US"/>
           </a:p>
@@ -860,7 +862,7 @@
           <a:p>
             <a:fld id="{C3FDBE07-93C4-1244-B5BB-C293211E703B}" type="datetimeFigureOut">
               <a:rPr lang="en-US" smtClean="0"/>
-              <a:t>12/29/22</a:t>
+              <a:t>2/18/23</a:t>
             </a:fld>
             <a:endParaRPr lang="en-US"/>
           </a:p>
@@ -1106,7 +1108,7 @@
           <a:p>
             <a:fld id="{C3FDBE07-93C4-1244-B5BB-C293211E703B}" type="datetimeFigureOut">
               <a:rPr lang="en-US" smtClean="0"/>
-              <a:t>12/29/22</a:t>
+              <a:t>2/18/23</a:t>
             </a:fld>
             <a:endParaRPr lang="en-US"/>
           </a:p>
@@ -1394,7 +1396,7 @@
           <a:p>
             <a:fld id="{C3FDBE07-93C4-1244-B5BB-C293211E703B}" type="datetimeFigureOut">
               <a:rPr lang="en-US" smtClean="0"/>
-              <a:t>12/29/22</a:t>
+              <a:t>2/18/23</a:t>
             </a:fld>
             <a:endParaRPr lang="en-US"/>
           </a:p>
@@ -1816,7 +1818,7 @@
           <a:p>
             <a:fld id="{C3FDBE07-93C4-1244-B5BB-C293211E703B}" type="datetimeFigureOut">
               <a:rPr lang="en-US" smtClean="0"/>
-              <a:t>12/29/22</a:t>
+              <a:t>2/18/23</a:t>
             </a:fld>
             <a:endParaRPr lang="en-US"/>
           </a:p>
@@ -1934,7 +1936,7 @@
           <a:p>
             <a:fld id="{C3FDBE07-93C4-1244-B5BB-C293211E703B}" type="datetimeFigureOut">
               <a:rPr lang="en-US" smtClean="0"/>
-              <a:t>12/29/22</a:t>
+              <a:t>2/18/23</a:t>
             </a:fld>
             <a:endParaRPr lang="en-US"/>
           </a:p>
@@ -2029,7 +2031,7 @@
           <a:p>
             <a:fld id="{C3FDBE07-93C4-1244-B5BB-C293211E703B}" type="datetimeFigureOut">
               <a:rPr lang="en-US" smtClean="0"/>
-              <a:t>12/29/22</a:t>
+              <a:t>2/18/23</a:t>
             </a:fld>
             <a:endParaRPr lang="en-US"/>
           </a:p>
@@ -2306,7 +2308,7 @@
           <a:p>
             <a:fld id="{C3FDBE07-93C4-1244-B5BB-C293211E703B}" type="datetimeFigureOut">
               <a:rPr lang="en-US" smtClean="0"/>
-              <a:t>12/29/22</a:t>
+              <a:t>2/18/23</a:t>
             </a:fld>
             <a:endParaRPr lang="en-US"/>
           </a:p>
@@ -2559,7 +2561,7 @@
           <a:p>
             <a:fld id="{C3FDBE07-93C4-1244-B5BB-C293211E703B}" type="datetimeFigureOut">
               <a:rPr lang="en-US" smtClean="0"/>
-              <a:t>12/29/22</a:t>
+              <a:t>2/18/23</a:t>
             </a:fld>
             <a:endParaRPr lang="en-US"/>
           </a:p>
@@ -2772,7 +2774,7 @@
           <a:p>
             <a:fld id="{C3FDBE07-93C4-1244-B5BB-C293211E703B}" type="datetimeFigureOut">
               <a:rPr lang="en-US" smtClean="0"/>
-              <a:t>12/29/22</a:t>
+              <a:t>2/18/23</a:t>
             </a:fld>
             <a:endParaRPr lang="en-US"/>
           </a:p>
@@ -29550,7 +29552,7 @@
           <a:graphicData uri="http://schemas.openxmlformats.org/presentationml/2006/ole">
             <mc:AlternateContent xmlns:mc="http://schemas.openxmlformats.org/markup-compatibility/2006">
               <mc:Choice xmlns:v="urn:schemas-microsoft-com:vml" Requires="v">
-                <p:oleObj spid="_x0000_s1208" name="Equation" r:id="rId3" imgW="1714500" imgH="1638300" progId="Equation.3">
+                <p:oleObj spid="_x0000_s1221" name="Equation" r:id="rId3" imgW="1714500" imgH="1638300" progId="Equation.3">
                   <p:embed/>
                 </p:oleObj>
               </mc:Choice>
@@ -29607,7 +29609,7 @@
           <a:graphicData uri="http://schemas.openxmlformats.org/presentationml/2006/ole">
             <mc:AlternateContent xmlns:mc="http://schemas.openxmlformats.org/markup-compatibility/2006">
               <mc:Choice xmlns:v="urn:schemas-microsoft-com:vml" Requires="v">
-                <p:oleObj spid="_x0000_s1209" name="Equation" r:id="rId5" imgW="2044700" imgH="292100" progId="Equation.3">
+                <p:oleObj spid="_x0000_s1222" name="Equation" r:id="rId5" imgW="2044700" imgH="292100" progId="Equation.3">
                   <p:embed/>
                 </p:oleObj>
               </mc:Choice>
@@ -31189,7 +31191,7 @@
           <a:p>
             <a:r>
               <a:rPr lang="en-US" dirty="0" smtClean="0"/>
-              <a:t>Ground Station</a:t>
+              <a:t>Hardware</a:t>
             </a:r>
             <a:endParaRPr lang="en-US" dirty="0"/>
           </a:p>
@@ -31210,10 +31212,6 @@
           <a:bodyPr/>
           <a:lstStyle/>
           <a:p>
-            <a:r>
-              <a:rPr lang="en-US" dirty="0" smtClean="0"/>
-              <a:t>Ground Station</a:t>
-            </a:r>
             <a:endParaRPr lang="en-US" dirty="0"/>
           </a:p>
         </p:txBody>
@@ -31221,7 +31219,7 @@
     </p:spTree>
     <p:extLst>
       <p:ext uri="{BB962C8B-B14F-4D97-AF65-F5344CB8AC3E}">
-        <p14:creationId xmlns:p14="http://schemas.microsoft.com/office/powerpoint/2010/main" val="3317073900"/>
+        <p14:creationId xmlns:p14="http://schemas.microsoft.com/office/powerpoint/2010/main" val="3624962643"/>
       </p:ext>
     </p:extLst>
   </p:cSld>
@@ -31444,109 +31442,964 @@
           <a:bodyPr/>
           <a:lstStyle/>
           <a:p>
-            <a:r>
-              <a:rPr lang="en-US" dirty="0" smtClean="0"/>
-              <a:t>Options</a:t>
-            </a:r>
             <a:endParaRPr lang="en-US" dirty="0"/>
           </a:p>
         </p:txBody>
       </p:sp>
-      <p:sp>
-        <p:nvSpPr>
-          <p:cNvPr id="3" name="Content Placeholder 2"/>
-          <p:cNvSpPr>
-            <a:spLocks noGrp="1"/>
-          </p:cNvSpPr>
+      <p:graphicFrame>
+        <p:nvGraphicFramePr>
+          <p:cNvPr id="5" name="Content Placeholder 4"/>
+          <p:cNvGraphicFramePr>
+            <a:graphicFrameLocks noGrp="1"/>
+          </p:cNvGraphicFramePr>
           <p:nvPr>
             <p:ph idx="1"/>
+            <p:extLst>
+              <p:ext uri="{D42A27DB-BD31-4B8C-83A1-F6EECF244321}">
+                <p14:modId xmlns:p14="http://schemas.microsoft.com/office/powerpoint/2010/main" val="3354637630"/>
+              </p:ext>
+            </p:extLst>
           </p:nvPr>
-        </p:nvSpPr>
-        <p:spPr/>
-        <p:txBody>
-          <a:bodyPr>
-            <a:normAutofit lnSpcReduction="10000"/>
+        </p:nvGraphicFramePr>
+        <p:xfrm>
+          <a:off x="457200" y="1791290"/>
+          <a:ext cx="8229599" cy="3596640"/>
+        </p:xfrm>
+        <a:graphic>
+          <a:graphicData uri="http://schemas.openxmlformats.org/drawingml/2006/table">
+            <a:tbl>
+              <a:tblPr firstRow="1" bandRow="1">
+                <a:tableStyleId>{5C22544A-7EE6-4342-B048-85BDC9FD1C3A}</a:tableStyleId>
+              </a:tblPr>
+              <a:tblGrid>
+                <a:gridCol w="1175657"/>
+                <a:gridCol w="1175657"/>
+                <a:gridCol w="1175657"/>
+                <a:gridCol w="841829"/>
+                <a:gridCol w="1509485"/>
+                <a:gridCol w="1175657"/>
+                <a:gridCol w="1175657"/>
+              </a:tblGrid>
+              <a:tr h="370840">
+                <a:tc>
+                  <a:txBody>
+                    <a:bodyPr/>
+                    <a:lstStyle/>
+                    <a:p>
+                      <a:r>
+                        <a:rPr lang="en-US" sz="1200" dirty="0" smtClean="0"/>
+                        <a:t>Hardware</a:t>
+                      </a:r>
+                      <a:endParaRPr lang="en-US" sz="1200" dirty="0"/>
+                    </a:p>
+                  </a:txBody>
+                  <a:tcPr/>
+                </a:tc>
+                <a:tc>
+                  <a:txBody>
+                    <a:bodyPr/>
+                    <a:lstStyle/>
+                    <a:p>
+                      <a:r>
+                        <a:rPr lang="en-US" sz="1200" dirty="0" smtClean="0"/>
+                        <a:t>Radio</a:t>
+                      </a:r>
+                      <a:r>
+                        <a:rPr lang="en-US" sz="1200" baseline="0" dirty="0" smtClean="0"/>
+                        <a:t> Frequency</a:t>
+                      </a:r>
+                      <a:endParaRPr lang="en-US" sz="1200" dirty="0"/>
+                    </a:p>
+                  </a:txBody>
+                  <a:tcPr/>
+                </a:tc>
+                <a:tc>
+                  <a:txBody>
+                    <a:bodyPr/>
+                    <a:lstStyle/>
+                    <a:p>
+                      <a:r>
+                        <a:rPr lang="en-US" sz="1200" dirty="0" smtClean="0"/>
+                        <a:t>Voltage</a:t>
+                      </a:r>
+                      <a:endParaRPr lang="en-US" sz="1200" dirty="0"/>
+                    </a:p>
+                  </a:txBody>
+                  <a:tcPr/>
+                </a:tc>
+                <a:tc>
+                  <a:txBody>
+                    <a:bodyPr/>
+                    <a:lstStyle/>
+                    <a:p>
+                      <a:r>
+                        <a:rPr lang="en-US" sz="1200" dirty="0" smtClean="0"/>
+                        <a:t>Current (Peak)</a:t>
+                      </a:r>
+                      <a:endParaRPr lang="en-US" sz="1200" dirty="0"/>
+                    </a:p>
+                  </a:txBody>
+                  <a:tcPr/>
+                </a:tc>
+                <a:tc>
+                  <a:txBody>
+                    <a:bodyPr/>
+                    <a:lstStyle/>
+                    <a:p>
+                      <a:r>
+                        <a:rPr lang="en-US" sz="1200" dirty="0" smtClean="0"/>
+                        <a:t>Max Power Draw</a:t>
+                      </a:r>
+                      <a:endParaRPr lang="en-US" sz="1200" dirty="0"/>
+                    </a:p>
+                  </a:txBody>
+                  <a:tcPr/>
+                </a:tc>
+                <a:tc>
+                  <a:txBody>
+                    <a:bodyPr/>
+                    <a:lstStyle/>
+                    <a:p>
+                      <a:r>
+                        <a:rPr lang="en-US" sz="1200" dirty="0" smtClean="0"/>
+                        <a:t>IO</a:t>
+                      </a:r>
+                      <a:endParaRPr lang="en-US" sz="1200" dirty="0"/>
+                    </a:p>
+                  </a:txBody>
+                  <a:tcPr/>
+                </a:tc>
+                <a:tc>
+                  <a:txBody>
+                    <a:bodyPr/>
+                    <a:lstStyle/>
+                    <a:p>
+                      <a:r>
+                        <a:rPr lang="en-US" sz="1200" dirty="0" smtClean="0"/>
+                        <a:t>Pins</a:t>
+                      </a:r>
+                      <a:endParaRPr lang="en-US" sz="1200" dirty="0"/>
+                    </a:p>
+                  </a:txBody>
+                  <a:tcPr/>
+                </a:tc>
+              </a:tr>
+              <a:tr h="370840">
+                <a:tc>
+                  <a:txBody>
+                    <a:bodyPr/>
+                    <a:lstStyle/>
+                    <a:p>
+                      <a:r>
+                        <a:rPr lang="en-US" sz="1200" dirty="0" smtClean="0"/>
+                        <a:t>GPS-Neo6m</a:t>
+                      </a:r>
+                      <a:endParaRPr lang="en-US" sz="1200" dirty="0"/>
+                    </a:p>
+                  </a:txBody>
+                  <a:tcPr/>
+                </a:tc>
+                <a:tc>
+                  <a:txBody>
+                    <a:bodyPr/>
+                    <a:lstStyle/>
+                    <a:p>
+                      <a:r>
+                        <a:rPr lang="en-US" sz="1200" dirty="0" smtClean="0"/>
+                        <a:t>1.575 GHz</a:t>
+                      </a:r>
+                      <a:endParaRPr lang="en-US" sz="1200" dirty="0"/>
+                    </a:p>
+                  </a:txBody>
+                  <a:tcPr/>
+                </a:tc>
+                <a:tc>
+                  <a:txBody>
+                    <a:bodyPr/>
+                    <a:lstStyle/>
+                    <a:p>
+                      <a:r>
+                        <a:rPr lang="en-US" sz="1200" dirty="0" smtClean="0"/>
+                        <a:t>2.7-3.6V</a:t>
+                      </a:r>
+                      <a:endParaRPr lang="en-US" sz="1200" dirty="0"/>
+                    </a:p>
+                  </a:txBody>
+                  <a:tcPr/>
+                </a:tc>
+                <a:tc>
+                  <a:txBody>
+                    <a:bodyPr/>
+                    <a:lstStyle/>
+                    <a:p>
+                      <a:r>
+                        <a:rPr lang="en-US" sz="1200" dirty="0" smtClean="0"/>
+                        <a:t>50mA</a:t>
+                      </a:r>
+                      <a:endParaRPr lang="en-US" sz="1200" dirty="0"/>
+                    </a:p>
+                  </a:txBody>
+                  <a:tcPr/>
+                </a:tc>
+                <a:tc>
+                  <a:txBody>
+                    <a:bodyPr/>
+                    <a:lstStyle/>
+                    <a:p>
+                      <a:r>
+                        <a:rPr lang="en-US" sz="1200" dirty="0" smtClean="0"/>
+                        <a:t>(3.3x0.05) 0.165W</a:t>
+                      </a:r>
+                      <a:endParaRPr lang="en-US" sz="1200" dirty="0"/>
+                    </a:p>
+                  </a:txBody>
+                  <a:tcPr/>
+                </a:tc>
+                <a:tc>
+                  <a:txBody>
+                    <a:bodyPr/>
+                    <a:lstStyle/>
+                    <a:p>
+                      <a:r>
+                        <a:rPr lang="en-US" sz="1200" dirty="0" smtClean="0"/>
+                        <a:t>UART</a:t>
+                      </a:r>
+                      <a:endParaRPr lang="en-US" sz="1200" dirty="0"/>
+                    </a:p>
+                  </a:txBody>
+                  <a:tcPr/>
+                </a:tc>
+                <a:tc>
+                  <a:txBody>
+                    <a:bodyPr/>
+                    <a:lstStyle/>
+                    <a:p>
+                      <a:endParaRPr lang="en-US" sz="1200" dirty="0"/>
+                    </a:p>
+                  </a:txBody>
+                  <a:tcPr/>
+                </a:tc>
+              </a:tr>
+              <a:tr h="370840">
+                <a:tc>
+                  <a:txBody>
+                    <a:bodyPr/>
+                    <a:lstStyle/>
+                    <a:p>
+                      <a:r>
+                        <a:rPr lang="en-US" sz="1200" dirty="0" smtClean="0"/>
+                        <a:t>APC220 Radio</a:t>
+                      </a:r>
+                      <a:endParaRPr lang="en-US" sz="1200" dirty="0"/>
+                    </a:p>
+                  </a:txBody>
+                  <a:tcPr/>
+                </a:tc>
+                <a:tc>
+                  <a:txBody>
+                    <a:bodyPr/>
+                    <a:lstStyle/>
+                    <a:p>
+                      <a:r>
+                        <a:rPr lang="en-US" sz="1200" dirty="0" smtClean="0"/>
+                        <a:t>431-478 MHz</a:t>
+                      </a:r>
+                      <a:endParaRPr lang="en-US" sz="1200" dirty="0"/>
+                    </a:p>
+                  </a:txBody>
+                  <a:tcPr/>
+                </a:tc>
+                <a:tc>
+                  <a:txBody>
+                    <a:bodyPr/>
+                    <a:lstStyle/>
+                    <a:p>
+                      <a:r>
+                        <a:rPr lang="en-US" sz="1200" dirty="0" smtClean="0"/>
+                        <a:t>3.3-5.5V</a:t>
+                      </a:r>
+                      <a:endParaRPr lang="en-US" sz="1200" dirty="0"/>
+                    </a:p>
+                  </a:txBody>
+                  <a:tcPr/>
+                </a:tc>
+                <a:tc>
+                  <a:txBody>
+                    <a:bodyPr/>
+                    <a:lstStyle/>
+                    <a:p>
+                      <a:r>
+                        <a:rPr lang="en-US" sz="1200" dirty="0" smtClean="0"/>
+                        <a:t>25-35mA</a:t>
+                      </a:r>
+                      <a:endParaRPr lang="en-US" sz="1200" dirty="0"/>
+                    </a:p>
+                  </a:txBody>
+                  <a:tcPr/>
+                </a:tc>
+                <a:tc>
+                  <a:txBody>
+                    <a:bodyPr/>
+                    <a:lstStyle/>
+                    <a:p>
+                      <a:r>
+                        <a:rPr lang="en-US" sz="1200" dirty="0" smtClean="0"/>
+                        <a:t>(3.3x0.035)</a:t>
+                      </a:r>
+                      <a:r>
+                        <a:rPr lang="en-US" sz="1200" baseline="0" dirty="0" smtClean="0"/>
+                        <a:t> </a:t>
+                      </a:r>
+                      <a:r>
+                        <a:rPr lang="en-US" sz="1200" dirty="0" smtClean="0"/>
+                        <a:t>0.1155W</a:t>
+                      </a:r>
+                      <a:endParaRPr lang="en-US" sz="1200" dirty="0"/>
+                    </a:p>
+                  </a:txBody>
+                  <a:tcPr/>
+                </a:tc>
+                <a:tc>
+                  <a:txBody>
+                    <a:bodyPr/>
+                    <a:lstStyle/>
+                    <a:p>
+                      <a:r>
+                        <a:rPr lang="en-US" sz="1200" dirty="0" smtClean="0"/>
+                        <a:t>UART</a:t>
+                      </a:r>
+                      <a:endParaRPr lang="en-US" sz="1200" dirty="0"/>
+                    </a:p>
+                  </a:txBody>
+                  <a:tcPr/>
+                </a:tc>
+                <a:tc>
+                  <a:txBody>
+                    <a:bodyPr/>
+                    <a:lstStyle/>
+                    <a:p>
+                      <a:endParaRPr lang="en-US" sz="1200" dirty="0"/>
+                    </a:p>
+                  </a:txBody>
+                  <a:tcPr/>
+                </a:tc>
+              </a:tr>
+              <a:tr h="370840">
+                <a:tc>
+                  <a:txBody>
+                    <a:bodyPr/>
+                    <a:lstStyle/>
+                    <a:p>
+                      <a:r>
+                        <a:rPr lang="en-US" sz="1200" dirty="0" smtClean="0"/>
+                        <a:t>HC05 BLE</a:t>
+                      </a:r>
+                      <a:endParaRPr lang="en-US" sz="1200" dirty="0"/>
+                    </a:p>
+                  </a:txBody>
+                  <a:tcPr/>
+                </a:tc>
+                <a:tc>
+                  <a:txBody>
+                    <a:bodyPr/>
+                    <a:lstStyle/>
+                    <a:p>
+                      <a:r>
+                        <a:rPr lang="en-US" sz="1200" dirty="0" smtClean="0"/>
+                        <a:t>2.4 GHz</a:t>
+                      </a:r>
+                      <a:endParaRPr lang="en-US" sz="1200" dirty="0"/>
+                    </a:p>
+                  </a:txBody>
+                  <a:tcPr/>
+                </a:tc>
+                <a:tc>
+                  <a:txBody>
+                    <a:bodyPr/>
+                    <a:lstStyle/>
+                    <a:p>
+                      <a:r>
+                        <a:rPr lang="en-US" sz="1200" dirty="0" smtClean="0"/>
+                        <a:t>3.3V</a:t>
+                      </a:r>
+                      <a:endParaRPr lang="en-US" sz="1200" dirty="0"/>
+                    </a:p>
+                  </a:txBody>
+                  <a:tcPr/>
+                </a:tc>
+                <a:tc>
+                  <a:txBody>
+                    <a:bodyPr/>
+                    <a:lstStyle/>
+                    <a:p>
+                      <a:r>
+                        <a:rPr lang="en-US" sz="1200" dirty="0" smtClean="0"/>
+                        <a:t>50mA</a:t>
+                      </a:r>
+                      <a:endParaRPr lang="en-US" sz="1200" dirty="0"/>
+                    </a:p>
+                  </a:txBody>
+                  <a:tcPr/>
+                </a:tc>
+                <a:tc>
+                  <a:txBody>
+                    <a:bodyPr/>
+                    <a:lstStyle/>
+                    <a:p>
+                      <a:r>
+                        <a:rPr lang="en-US" sz="1200" dirty="0" smtClean="0"/>
+                        <a:t>(3.3x0.05) 0.165W</a:t>
+                      </a:r>
+                      <a:endParaRPr lang="en-US" sz="1200" dirty="0"/>
+                    </a:p>
+                  </a:txBody>
+                  <a:tcPr/>
+                </a:tc>
+                <a:tc>
+                  <a:txBody>
+                    <a:bodyPr/>
+                    <a:lstStyle/>
+                    <a:p>
+                      <a:r>
+                        <a:rPr lang="en-US" sz="1200" dirty="0" smtClean="0"/>
+                        <a:t>UART</a:t>
+                      </a:r>
+                      <a:endParaRPr lang="en-US" sz="1200" dirty="0"/>
+                    </a:p>
+                  </a:txBody>
+                  <a:tcPr/>
+                </a:tc>
+                <a:tc>
+                  <a:txBody>
+                    <a:bodyPr/>
+                    <a:lstStyle/>
+                    <a:p>
+                      <a:endParaRPr lang="en-US" sz="1200" dirty="0"/>
+                    </a:p>
+                  </a:txBody>
+                  <a:tcPr/>
+                </a:tc>
+              </a:tr>
+              <a:tr h="370840">
+                <a:tc>
+                  <a:txBody>
+                    <a:bodyPr/>
+                    <a:lstStyle/>
+                    <a:p>
+                      <a:r>
+                        <a:rPr lang="en-US" sz="1200" dirty="0" smtClean="0"/>
+                        <a:t>IMU GY-521</a:t>
+                      </a:r>
+                      <a:endParaRPr lang="en-US" sz="1200" dirty="0"/>
+                    </a:p>
+                  </a:txBody>
+                  <a:tcPr/>
+                </a:tc>
+                <a:tc>
+                  <a:txBody>
+                    <a:bodyPr/>
+                    <a:lstStyle/>
+                    <a:p>
+                      <a:endParaRPr lang="en-US" sz="1200" dirty="0"/>
+                    </a:p>
+                  </a:txBody>
+                  <a:tcPr/>
+                </a:tc>
+                <a:tc>
+                  <a:txBody>
+                    <a:bodyPr/>
+                    <a:lstStyle/>
+                    <a:p>
+                      <a:pPr marL="0" marR="0" indent="0" algn="l" defTabSz="457200" rtl="0" eaLnBrk="1" fontAlgn="auto" latinLnBrk="0" hangingPunct="1">
+                        <a:lnSpc>
+                          <a:spcPct val="100000"/>
+                        </a:lnSpc>
+                        <a:spcBef>
+                          <a:spcPts val="0"/>
+                        </a:spcBef>
+                        <a:spcAft>
+                          <a:spcPts val="0"/>
+                        </a:spcAft>
+                        <a:buClrTx/>
+                        <a:buSzTx/>
+                        <a:buFontTx/>
+                        <a:buNone/>
+                        <a:tabLst/>
+                        <a:defRPr/>
+                      </a:pPr>
+                      <a:r>
+                        <a:rPr lang="en-US" sz="1200" dirty="0" smtClean="0"/>
+                        <a:t>2.375-3.46V</a:t>
+                      </a:r>
+                    </a:p>
+                  </a:txBody>
+                  <a:tcPr/>
+                </a:tc>
+                <a:tc>
+                  <a:txBody>
+                    <a:bodyPr/>
+                    <a:lstStyle/>
+                    <a:p>
+                      <a:r>
+                        <a:rPr lang="en-US" sz="1200" dirty="0" smtClean="0"/>
+                        <a:t>3.8mA</a:t>
+                      </a:r>
+                      <a:endParaRPr lang="en-US" sz="1200" dirty="0"/>
+                    </a:p>
+                  </a:txBody>
+                  <a:tcPr/>
+                </a:tc>
+                <a:tc>
+                  <a:txBody>
+                    <a:bodyPr/>
+                    <a:lstStyle/>
+                    <a:p>
+                      <a:r>
+                        <a:rPr lang="en-US" sz="1200" dirty="0" smtClean="0"/>
+                        <a:t>(3.3x0.038) 0.1254W</a:t>
+                      </a:r>
+                      <a:endParaRPr lang="en-US" sz="1200" dirty="0"/>
+                    </a:p>
+                  </a:txBody>
+                  <a:tcPr/>
+                </a:tc>
+                <a:tc>
+                  <a:txBody>
+                    <a:bodyPr/>
+                    <a:lstStyle/>
+                    <a:p>
+                      <a:r>
+                        <a:rPr lang="en-US" sz="1200" dirty="0" smtClean="0"/>
+                        <a:t>I2C</a:t>
+                      </a:r>
+                      <a:endParaRPr lang="en-US" sz="1200" dirty="0"/>
+                    </a:p>
+                  </a:txBody>
+                  <a:tcPr/>
+                </a:tc>
+                <a:tc>
+                  <a:txBody>
+                    <a:bodyPr/>
+                    <a:lstStyle/>
+                    <a:p>
+                      <a:endParaRPr lang="en-US" sz="1200" dirty="0"/>
+                    </a:p>
+                  </a:txBody>
+                  <a:tcPr/>
+                </a:tc>
+              </a:tr>
+              <a:tr h="370840">
+                <a:tc>
+                  <a:txBody>
+                    <a:bodyPr/>
+                    <a:lstStyle/>
+                    <a:p>
+                      <a:r>
+                        <a:rPr lang="en-US" sz="1200" dirty="0" err="1" smtClean="0"/>
+                        <a:t>Baro</a:t>
+                      </a:r>
+                      <a:r>
+                        <a:rPr lang="en-US" sz="1200" dirty="0" smtClean="0"/>
+                        <a:t> BMP180</a:t>
+                      </a:r>
+                      <a:endParaRPr lang="en-US" sz="1200" dirty="0"/>
+                    </a:p>
+                  </a:txBody>
+                  <a:tcPr/>
+                </a:tc>
+                <a:tc>
+                  <a:txBody>
+                    <a:bodyPr/>
+                    <a:lstStyle/>
+                    <a:p>
+                      <a:endParaRPr lang="en-US" sz="1200" dirty="0"/>
+                    </a:p>
+                  </a:txBody>
+                  <a:tcPr/>
+                </a:tc>
+                <a:tc>
+                  <a:txBody>
+                    <a:bodyPr/>
+                    <a:lstStyle/>
+                    <a:p>
+                      <a:r>
+                        <a:rPr lang="en-US" sz="1200" dirty="0" smtClean="0"/>
+                        <a:t>1.8-3.6V</a:t>
+                      </a:r>
+                      <a:endParaRPr lang="en-US" sz="1200" dirty="0"/>
+                    </a:p>
+                  </a:txBody>
+                  <a:tcPr/>
+                </a:tc>
+                <a:tc>
+                  <a:txBody>
+                    <a:bodyPr/>
+                    <a:lstStyle/>
+                    <a:p>
+                      <a:r>
+                        <a:rPr lang="en-US" sz="1200" dirty="0" smtClean="0"/>
+                        <a:t>0.032 mA (0.65mA)</a:t>
+                      </a:r>
+                      <a:endParaRPr lang="en-US" sz="1200" dirty="0"/>
+                    </a:p>
+                  </a:txBody>
+                  <a:tcPr/>
+                </a:tc>
+                <a:tc>
+                  <a:txBody>
+                    <a:bodyPr/>
+                    <a:lstStyle/>
+                    <a:p>
+                      <a:r>
+                        <a:rPr lang="en-US" sz="1200" dirty="0" smtClean="0"/>
+                        <a:t> (3.3x0.032) 0.1056W</a:t>
+                      </a:r>
+                      <a:endParaRPr lang="en-US" sz="1200" dirty="0"/>
+                    </a:p>
+                  </a:txBody>
+                  <a:tcPr/>
+                </a:tc>
+                <a:tc>
+                  <a:txBody>
+                    <a:bodyPr/>
+                    <a:lstStyle/>
+                    <a:p>
+                      <a:r>
+                        <a:rPr lang="en-US" sz="1200" dirty="0" smtClean="0"/>
+                        <a:t>I2C</a:t>
+                      </a:r>
+                      <a:endParaRPr lang="en-US" sz="1200" dirty="0"/>
+                    </a:p>
+                  </a:txBody>
+                  <a:tcPr/>
+                </a:tc>
+                <a:tc>
+                  <a:txBody>
+                    <a:bodyPr/>
+                    <a:lstStyle/>
+                    <a:p>
+                      <a:endParaRPr lang="en-US" sz="1200" dirty="0"/>
+                    </a:p>
+                  </a:txBody>
+                  <a:tcPr/>
+                </a:tc>
+              </a:tr>
+              <a:tr h="370840">
+                <a:tc>
+                  <a:txBody>
+                    <a:bodyPr/>
+                    <a:lstStyle/>
+                    <a:p>
+                      <a:r>
+                        <a:rPr lang="en-US" sz="1200" dirty="0" smtClean="0"/>
+                        <a:t>Teensy</a:t>
+                      </a:r>
+                      <a:r>
+                        <a:rPr lang="en-US" sz="1200" baseline="0" dirty="0" smtClean="0"/>
+                        <a:t> 4.0</a:t>
+                      </a:r>
+                      <a:endParaRPr lang="en-US" sz="1200" dirty="0"/>
+                    </a:p>
+                  </a:txBody>
+                  <a:tcPr/>
+                </a:tc>
+                <a:tc>
+                  <a:txBody>
+                    <a:bodyPr/>
+                    <a:lstStyle/>
+                    <a:p>
+                      <a:endParaRPr lang="en-US" sz="1200"/>
+                    </a:p>
+                  </a:txBody>
+                  <a:tcPr/>
+                </a:tc>
+                <a:tc>
+                  <a:txBody>
+                    <a:bodyPr/>
+                    <a:lstStyle/>
+                    <a:p>
+                      <a:r>
+                        <a:rPr lang="en-US" sz="1200" smtClean="0"/>
+                        <a:t>3.6-5.5V</a:t>
+                      </a:r>
+                      <a:endParaRPr lang="en-US" sz="1200" dirty="0"/>
+                    </a:p>
+                  </a:txBody>
+                  <a:tcPr/>
+                </a:tc>
+                <a:tc>
+                  <a:txBody>
+                    <a:bodyPr/>
+                    <a:lstStyle/>
+                    <a:p>
+                      <a:r>
+                        <a:rPr lang="en-US" sz="1200" dirty="0" smtClean="0"/>
+                        <a:t>250mA</a:t>
+                      </a:r>
+                      <a:endParaRPr lang="en-US" sz="1200" dirty="0"/>
+                    </a:p>
+                  </a:txBody>
+                  <a:tcPr/>
+                </a:tc>
+                <a:tc>
+                  <a:txBody>
+                    <a:bodyPr/>
+                    <a:lstStyle/>
+                    <a:p>
+                      <a:r>
+                        <a:rPr lang="en-US" sz="1200" dirty="0" smtClean="0"/>
+                        <a:t>(3.3x0.25) 0.825W</a:t>
+                      </a:r>
+                      <a:endParaRPr lang="en-US" sz="1200" dirty="0"/>
+                    </a:p>
+                  </a:txBody>
+                  <a:tcPr/>
+                </a:tc>
+                <a:tc>
+                  <a:txBody>
+                    <a:bodyPr/>
+                    <a:lstStyle/>
+                    <a:p>
+                      <a:endParaRPr lang="en-US" sz="1200" dirty="0"/>
+                    </a:p>
+                  </a:txBody>
+                  <a:tcPr/>
+                </a:tc>
+                <a:tc>
+                  <a:txBody>
+                    <a:bodyPr/>
+                    <a:lstStyle/>
+                    <a:p>
+                      <a:endParaRPr lang="en-US" sz="1200" dirty="0"/>
+                    </a:p>
+                  </a:txBody>
+                  <a:tcPr/>
+                </a:tc>
+              </a:tr>
+              <a:tr h="370840">
+                <a:tc>
+                  <a:txBody>
+                    <a:bodyPr/>
+                    <a:lstStyle/>
+                    <a:p>
+                      <a:r>
+                        <a:rPr lang="en-US" sz="1200" dirty="0" err="1" smtClean="0"/>
+                        <a:t>Arduino</a:t>
+                      </a:r>
+                      <a:r>
+                        <a:rPr lang="en-US" sz="1200" dirty="0" smtClean="0"/>
+                        <a:t> Nano</a:t>
+                      </a:r>
+                      <a:endParaRPr lang="en-US" sz="1200" dirty="0"/>
+                    </a:p>
+                  </a:txBody>
+                  <a:tcPr/>
+                </a:tc>
+                <a:tc>
+                  <a:txBody>
+                    <a:bodyPr/>
+                    <a:lstStyle/>
+                    <a:p>
+                      <a:endParaRPr lang="en-US" sz="1200" dirty="0"/>
+                    </a:p>
+                  </a:txBody>
+                  <a:tcPr/>
+                </a:tc>
+                <a:tc>
+                  <a:txBody>
+                    <a:bodyPr/>
+                    <a:lstStyle/>
+                    <a:p>
+                      <a:r>
+                        <a:rPr lang="en-US" sz="1200" dirty="0" smtClean="0"/>
+                        <a:t>7V-12V</a:t>
+                      </a:r>
+                      <a:endParaRPr lang="en-US" sz="1200" dirty="0"/>
+                    </a:p>
+                  </a:txBody>
+                  <a:tcPr/>
+                </a:tc>
+                <a:tc>
+                  <a:txBody>
+                    <a:bodyPr/>
+                    <a:lstStyle/>
+                    <a:p>
+                      <a:r>
+                        <a:rPr lang="en-US" sz="1200" dirty="0" smtClean="0"/>
+                        <a:t>250mA</a:t>
+                      </a:r>
+                      <a:endParaRPr lang="en-US" sz="1200" dirty="0"/>
+                    </a:p>
+                  </a:txBody>
+                  <a:tcPr/>
+                </a:tc>
+                <a:tc>
+                  <a:txBody>
+                    <a:bodyPr/>
+                    <a:lstStyle/>
+                    <a:p>
+                      <a:r>
+                        <a:rPr lang="en-US" sz="1200" dirty="0" smtClean="0"/>
+                        <a:t>(5x0.25) 1.25W</a:t>
+                      </a:r>
+                      <a:endParaRPr lang="en-US" sz="1200" dirty="0"/>
+                    </a:p>
+                  </a:txBody>
+                  <a:tcPr/>
+                </a:tc>
+                <a:tc>
+                  <a:txBody>
+                    <a:bodyPr/>
+                    <a:lstStyle/>
+                    <a:p>
+                      <a:endParaRPr lang="en-US" sz="1200" dirty="0"/>
+                    </a:p>
+                  </a:txBody>
+                  <a:tcPr/>
+                </a:tc>
+                <a:tc>
+                  <a:txBody>
+                    <a:bodyPr/>
+                    <a:lstStyle/>
+                    <a:p>
+                      <a:endParaRPr lang="en-US" sz="1200" dirty="0"/>
+                    </a:p>
+                  </a:txBody>
+                  <a:tcPr/>
+                </a:tc>
+              </a:tr>
+              <a:tr h="370840">
+                <a:tc>
+                  <a:txBody>
+                    <a:bodyPr/>
+                    <a:lstStyle/>
+                    <a:p>
+                      <a:r>
+                        <a:rPr lang="en-US" sz="1200" dirty="0" smtClean="0"/>
+                        <a:t>3.3V Regulator</a:t>
+                      </a:r>
+                      <a:endParaRPr lang="en-US" sz="1200" dirty="0"/>
+                    </a:p>
+                  </a:txBody>
+                  <a:tcPr/>
+                </a:tc>
+                <a:tc>
+                  <a:txBody>
+                    <a:bodyPr/>
+                    <a:lstStyle/>
+                    <a:p>
+                      <a:endParaRPr lang="en-US" sz="1200" dirty="0"/>
+                    </a:p>
+                  </a:txBody>
+                  <a:tcPr/>
+                </a:tc>
+                <a:tc>
+                  <a:txBody>
+                    <a:bodyPr/>
+                    <a:lstStyle/>
+                    <a:p>
+                      <a:r>
+                        <a:rPr lang="en-US" sz="1200" dirty="0" smtClean="0"/>
+                        <a:t>4.75-12</a:t>
+                      </a:r>
+                      <a:endParaRPr lang="en-US" sz="1200" dirty="0"/>
+                    </a:p>
+                  </a:txBody>
+                  <a:tcPr/>
+                </a:tc>
+                <a:tc>
+                  <a:txBody>
+                    <a:bodyPr/>
+                    <a:lstStyle/>
+                    <a:p>
+                      <a:r>
+                        <a:rPr lang="en-US" sz="1200" smtClean="0"/>
+                        <a:t>800mA output</a:t>
+                      </a:r>
+                      <a:endParaRPr lang="en-US" sz="1200" dirty="0"/>
+                    </a:p>
+                  </a:txBody>
+                  <a:tcPr/>
+                </a:tc>
+                <a:tc>
+                  <a:txBody>
+                    <a:bodyPr/>
+                    <a:lstStyle/>
+                    <a:p>
+                      <a:endParaRPr lang="en-US" sz="1200" dirty="0"/>
+                    </a:p>
+                  </a:txBody>
+                  <a:tcPr/>
+                </a:tc>
+                <a:tc>
+                  <a:txBody>
+                    <a:bodyPr/>
+                    <a:lstStyle/>
+                    <a:p>
+                      <a:endParaRPr lang="en-US" sz="1200" dirty="0"/>
+                    </a:p>
+                  </a:txBody>
+                  <a:tcPr/>
+                </a:tc>
+                <a:tc>
+                  <a:txBody>
+                    <a:bodyPr/>
+                    <a:lstStyle/>
+                    <a:p>
+                      <a:endParaRPr lang="en-US" sz="1200" dirty="0"/>
+                    </a:p>
+                  </a:txBody>
+                  <a:tcPr/>
+                </a:tc>
+              </a:tr>
+            </a:tbl>
+          </a:graphicData>
+        </a:graphic>
+      </p:graphicFrame>
+      <p:sp>
+        <p:nvSpPr>
+          <p:cNvPr id="6" name="TextBox 5"/>
+          <p:cNvSpPr txBox="1"/>
+          <p:nvPr/>
+        </p:nvSpPr>
+        <p:spPr>
+          <a:xfrm>
+            <a:off x="1344083" y="5556250"/>
+            <a:ext cx="3131837" cy="646331"/>
+          </a:xfrm>
+          <a:prstGeom prst="rect">
+            <a:avLst/>
+          </a:prstGeom>
+          <a:noFill/>
+        </p:spPr>
+        <p:txBody>
+          <a:bodyPr wrap="none" rtlCol="0">
+            <a:spAutoFit/>
           </a:bodyPr>
           <a:lstStyle/>
           <a:p>
             <a:r>
               <a:rPr lang="en-US" dirty="0" smtClean="0"/>
-              <a:t>Needs</a:t>
-            </a:r>
-          </a:p>
-          <a:p>
-            <a:pPr lvl="1"/>
-            <a:r>
-              <a:rPr lang="en-US" dirty="0" smtClean="0"/>
-              <a:t>Monitor data (whole flight)</a:t>
-            </a:r>
-          </a:p>
-          <a:p>
-            <a:pPr lvl="1"/>
-            <a:r>
-              <a:rPr lang="en-US" dirty="0" smtClean="0"/>
-              <a:t>Send data (close range) (future), </a:t>
-            </a:r>
-            <a:r>
-              <a:rPr lang="en-US" dirty="0" err="1" smtClean="0"/>
-              <a:t>bluetooth</a:t>
-            </a:r>
-            <a:endParaRPr lang="en-US" dirty="0" smtClean="0"/>
-          </a:p>
-          <a:p>
-            <a:pPr lvl="1"/>
-            <a:r>
-              <a:rPr lang="en-US" dirty="0" err="1" smtClean="0"/>
-              <a:t>Wifi</a:t>
-            </a:r>
-            <a:r>
-              <a:rPr lang="en-US" dirty="0" smtClean="0"/>
-              <a:t> connection for GPS, </a:t>
-            </a:r>
-            <a:r>
-              <a:rPr lang="en-US" dirty="0" err="1" smtClean="0"/>
-              <a:t>bluetooth</a:t>
-            </a:r>
-            <a:endParaRPr lang="en-US" dirty="0" smtClean="0"/>
-          </a:p>
-          <a:p>
-            <a:pPr lvl="1"/>
-            <a:endParaRPr lang="en-US" dirty="0" smtClean="0"/>
-          </a:p>
-          <a:p>
-            <a:r>
-              <a:rPr lang="en-US" dirty="0" smtClean="0"/>
-              <a:t>Options</a:t>
-            </a:r>
-          </a:p>
-          <a:p>
-            <a:pPr lvl="1"/>
-            <a:r>
-              <a:rPr lang="en-US" dirty="0" smtClean="0"/>
-              <a:t>Telemetry</a:t>
-            </a:r>
-          </a:p>
-          <a:p>
-            <a:pPr lvl="1"/>
-            <a:r>
-              <a:rPr lang="en-US" dirty="0" smtClean="0"/>
-              <a:t>Bluetooth</a:t>
-            </a:r>
-          </a:p>
-          <a:p>
-            <a:pPr lvl="1"/>
-            <a:r>
-              <a:rPr lang="en-US" dirty="0" err="1" smtClean="0"/>
-              <a:t>Wifi</a:t>
-            </a:r>
-            <a:endParaRPr lang="en-US" dirty="0"/>
+              <a:t>Drone Power = 1.3365W</a:t>
+            </a:r>
+          </a:p>
+          <a:p>
+            <a:r>
+              <a:rPr lang="en-US" dirty="0" smtClean="0"/>
+              <a:t>Ground </a:t>
+            </a:r>
+            <a:r>
+              <a:rPr lang="en-US" smtClean="0"/>
+              <a:t>Station Power = 1.5305</a:t>
+            </a:r>
+            <a:endParaRPr lang="en-US"/>
           </a:p>
         </p:txBody>
       </p:sp>
     </p:spTree>
     <p:extLst>
       <p:ext uri="{BB962C8B-B14F-4D97-AF65-F5344CB8AC3E}">
-        <p14:creationId xmlns:p14="http://schemas.microsoft.com/office/powerpoint/2010/main" val="2340551577"/>
+        <p14:creationId xmlns:p14="http://schemas.microsoft.com/office/powerpoint/2010/main" val="1308491989"/>
       </p:ext>
     </p:extLst>
   </p:cSld>
@@ -31590,7 +32443,7 @@
           <a:p>
             <a:r>
               <a:rPr lang="en-US" dirty="0" smtClean="0"/>
-              <a:t>Architecture</a:t>
+              <a:t>Ground Station</a:t>
             </a:r>
             <a:endParaRPr lang="en-US" dirty="0"/>
           </a:p>
@@ -31598,12 +32451,12 @@
       </p:sp>
       <p:sp>
         <p:nvSpPr>
-          <p:cNvPr id="3" name="Content Placeholder 2"/>
+          <p:cNvPr id="3" name="Text Placeholder 2"/>
           <p:cNvSpPr>
             <a:spLocks noGrp="1"/>
           </p:cNvSpPr>
           <p:nvPr>
-            <p:ph idx="1"/>
+            <p:ph type="body" idx="1"/>
           </p:nvPr>
         </p:nvSpPr>
         <p:spPr/>
@@ -31613,46 +32466,8 @@
           <a:p>
             <a:r>
               <a:rPr lang="en-US" dirty="0" smtClean="0"/>
-              <a:t>Drone has telemetry receiver (and RC receiver)</a:t>
-            </a:r>
-          </a:p>
-          <a:p>
-            <a:r>
-              <a:rPr lang="en-US" dirty="0" smtClean="0"/>
-              <a:t>Ground station has </a:t>
-            </a:r>
-            <a:r>
-              <a:rPr lang="en-US" dirty="0" err="1" smtClean="0"/>
-              <a:t>bluetooth</a:t>
-            </a:r>
-            <a:r>
-              <a:rPr lang="en-US" dirty="0" smtClean="0"/>
-              <a:t> and transmitter</a:t>
-            </a:r>
-          </a:p>
-          <a:p>
-            <a:pPr lvl="1"/>
-            <a:r>
-              <a:rPr lang="en-US" dirty="0" smtClean="0"/>
-              <a:t>Future: use as RC transmitter also</a:t>
-            </a:r>
-          </a:p>
-          <a:p>
-            <a:r>
-              <a:rPr lang="en-US" dirty="0" smtClean="0"/>
-              <a:t>Computer/iPhone app connects to ground station through </a:t>
-            </a:r>
-            <a:r>
-              <a:rPr lang="en-US" dirty="0" err="1" smtClean="0"/>
-              <a:t>bluetooth</a:t>
-            </a:r>
-            <a:r>
-              <a:rPr lang="en-US" smtClean="0"/>
-              <a:t>.</a:t>
-            </a:r>
-            <a:endParaRPr lang="en-US" dirty="0" smtClean="0"/>
-          </a:p>
-          <a:p>
+              <a:t>Ground Station</a:t>
+            </a:r>
             <a:endParaRPr lang="en-US" dirty="0"/>
           </a:p>
         </p:txBody>
@@ -31660,7 +32475,7 @@
     </p:spTree>
     <p:extLst>
       <p:ext uri="{BB962C8B-B14F-4D97-AF65-F5344CB8AC3E}">
-        <p14:creationId xmlns:p14="http://schemas.microsoft.com/office/powerpoint/2010/main" val="891112083"/>
+        <p14:creationId xmlns:p14="http://schemas.microsoft.com/office/powerpoint/2010/main" val="3317073900"/>
       </p:ext>
     </p:extLst>
   </p:cSld>
@@ -31703,6 +32518,264 @@
           <a:lstStyle/>
           <a:p>
             <a:r>
+              <a:rPr lang="en-US" dirty="0" smtClean="0"/>
+              <a:t>Options</a:t>
+            </a:r>
+            <a:endParaRPr lang="en-US" dirty="0"/>
+          </a:p>
+        </p:txBody>
+      </p:sp>
+      <p:sp>
+        <p:nvSpPr>
+          <p:cNvPr id="3" name="Content Placeholder 2"/>
+          <p:cNvSpPr>
+            <a:spLocks noGrp="1"/>
+          </p:cNvSpPr>
+          <p:nvPr>
+            <p:ph idx="1"/>
+          </p:nvPr>
+        </p:nvSpPr>
+        <p:spPr/>
+        <p:txBody>
+          <a:bodyPr>
+            <a:normAutofit lnSpcReduction="10000"/>
+          </a:bodyPr>
+          <a:lstStyle/>
+          <a:p>
+            <a:r>
+              <a:rPr lang="en-US" dirty="0" smtClean="0"/>
+              <a:t>Needs</a:t>
+            </a:r>
+          </a:p>
+          <a:p>
+            <a:pPr lvl="1"/>
+            <a:r>
+              <a:rPr lang="en-US" dirty="0" smtClean="0"/>
+              <a:t>Monitor data (whole flight)</a:t>
+            </a:r>
+          </a:p>
+          <a:p>
+            <a:pPr lvl="1"/>
+            <a:r>
+              <a:rPr lang="en-US" dirty="0" smtClean="0"/>
+              <a:t>Send data (close range) (future), </a:t>
+            </a:r>
+            <a:r>
+              <a:rPr lang="en-US" dirty="0" err="1" smtClean="0"/>
+              <a:t>bluetooth</a:t>
+            </a:r>
+            <a:endParaRPr lang="en-US" dirty="0" smtClean="0"/>
+          </a:p>
+          <a:p>
+            <a:pPr lvl="1"/>
+            <a:r>
+              <a:rPr lang="en-US" dirty="0" err="1" smtClean="0"/>
+              <a:t>Wifi</a:t>
+            </a:r>
+            <a:r>
+              <a:rPr lang="en-US" dirty="0" smtClean="0"/>
+              <a:t> connection for GPS, </a:t>
+            </a:r>
+            <a:r>
+              <a:rPr lang="en-US" dirty="0" err="1" smtClean="0"/>
+              <a:t>bluetooth</a:t>
+            </a:r>
+            <a:endParaRPr lang="en-US" dirty="0" smtClean="0"/>
+          </a:p>
+          <a:p>
+            <a:pPr lvl="1"/>
+            <a:endParaRPr lang="en-US" dirty="0" smtClean="0"/>
+          </a:p>
+          <a:p>
+            <a:r>
+              <a:rPr lang="en-US" dirty="0" smtClean="0"/>
+              <a:t>Options</a:t>
+            </a:r>
+          </a:p>
+          <a:p>
+            <a:pPr lvl="1"/>
+            <a:r>
+              <a:rPr lang="en-US" dirty="0" smtClean="0"/>
+              <a:t>Telemetry</a:t>
+            </a:r>
+          </a:p>
+          <a:p>
+            <a:pPr lvl="1"/>
+            <a:r>
+              <a:rPr lang="en-US" dirty="0" smtClean="0"/>
+              <a:t>Bluetooth</a:t>
+            </a:r>
+          </a:p>
+          <a:p>
+            <a:pPr lvl="1"/>
+            <a:r>
+              <a:rPr lang="en-US" dirty="0" err="1" smtClean="0"/>
+              <a:t>Wifi</a:t>
+            </a:r>
+            <a:endParaRPr lang="en-US" dirty="0"/>
+          </a:p>
+        </p:txBody>
+      </p:sp>
+    </p:spTree>
+    <p:extLst>
+      <p:ext uri="{BB962C8B-B14F-4D97-AF65-F5344CB8AC3E}">
+        <p14:creationId xmlns:p14="http://schemas.microsoft.com/office/powerpoint/2010/main" val="2340551577"/>
+      </p:ext>
+    </p:extLst>
+  </p:cSld>
+  <p:clrMapOvr>
+    <a:masterClrMapping/>
+  </p:clrMapOvr>
+</p:sld>
+</file>
+
+<file path=ppt/slides/slide53.xml><?xml version="1.0" encoding="utf-8"?>
+<p:sld xmlns:a="http://schemas.openxmlformats.org/drawingml/2006/main" xmlns:r="http://schemas.openxmlformats.org/officeDocument/2006/relationships" xmlns:p="http://schemas.openxmlformats.org/presentationml/2006/main">
+  <p:cSld>
+    <p:spTree>
+      <p:nvGrpSpPr>
+        <p:cNvPr id="1" name=""/>
+        <p:cNvGrpSpPr/>
+        <p:nvPr/>
+      </p:nvGrpSpPr>
+      <p:grpSpPr>
+        <a:xfrm>
+          <a:off x="0" y="0"/>
+          <a:ext cx="0" cy="0"/>
+          <a:chOff x="0" y="0"/>
+          <a:chExt cx="0" cy="0"/>
+        </a:xfrm>
+      </p:grpSpPr>
+      <p:sp>
+        <p:nvSpPr>
+          <p:cNvPr id="2" name="Title 1"/>
+          <p:cNvSpPr>
+            <a:spLocks noGrp="1"/>
+          </p:cNvSpPr>
+          <p:nvPr>
+            <p:ph type="title"/>
+          </p:nvPr>
+        </p:nvSpPr>
+        <p:spPr/>
+        <p:txBody>
+          <a:bodyPr/>
+          <a:lstStyle/>
+          <a:p>
+            <a:r>
+              <a:rPr lang="en-US" dirty="0" smtClean="0"/>
+              <a:t>Architecture</a:t>
+            </a:r>
+            <a:endParaRPr lang="en-US" dirty="0"/>
+          </a:p>
+        </p:txBody>
+      </p:sp>
+      <p:sp>
+        <p:nvSpPr>
+          <p:cNvPr id="3" name="Content Placeholder 2"/>
+          <p:cNvSpPr>
+            <a:spLocks noGrp="1"/>
+          </p:cNvSpPr>
+          <p:nvPr>
+            <p:ph idx="1"/>
+          </p:nvPr>
+        </p:nvSpPr>
+        <p:spPr/>
+        <p:txBody>
+          <a:bodyPr/>
+          <a:lstStyle/>
+          <a:p>
+            <a:r>
+              <a:rPr lang="en-US" dirty="0" smtClean="0"/>
+              <a:t>Drone has telemetry receiver (and RC receiver)</a:t>
+            </a:r>
+          </a:p>
+          <a:p>
+            <a:r>
+              <a:rPr lang="en-US" dirty="0" smtClean="0"/>
+              <a:t>Ground station has </a:t>
+            </a:r>
+            <a:r>
+              <a:rPr lang="en-US" dirty="0" err="1" smtClean="0"/>
+              <a:t>bluetooth</a:t>
+            </a:r>
+            <a:r>
+              <a:rPr lang="en-US" dirty="0" smtClean="0"/>
+              <a:t> and transmitter</a:t>
+            </a:r>
+          </a:p>
+          <a:p>
+            <a:pPr lvl="1"/>
+            <a:r>
+              <a:rPr lang="en-US" dirty="0" smtClean="0"/>
+              <a:t>Future: use as RC transmitter also</a:t>
+            </a:r>
+          </a:p>
+          <a:p>
+            <a:r>
+              <a:rPr lang="en-US" dirty="0" smtClean="0"/>
+              <a:t>Computer/iPhone app connects to ground station through </a:t>
+            </a:r>
+            <a:r>
+              <a:rPr lang="en-US" dirty="0" err="1" smtClean="0"/>
+              <a:t>bluetooth</a:t>
+            </a:r>
+            <a:r>
+              <a:rPr lang="en-US" smtClean="0"/>
+              <a:t>.</a:t>
+            </a:r>
+            <a:endParaRPr lang="en-US" dirty="0" smtClean="0"/>
+          </a:p>
+          <a:p>
+            <a:endParaRPr lang="en-US" dirty="0"/>
+          </a:p>
+        </p:txBody>
+      </p:sp>
+    </p:spTree>
+    <p:extLst>
+      <p:ext uri="{BB962C8B-B14F-4D97-AF65-F5344CB8AC3E}">
+        <p14:creationId xmlns:p14="http://schemas.microsoft.com/office/powerpoint/2010/main" val="891112083"/>
+      </p:ext>
+    </p:extLst>
+  </p:cSld>
+  <p:clrMapOvr>
+    <a:masterClrMapping/>
+  </p:clrMapOvr>
+</p:sld>
+</file>
+
+<file path=ppt/slides/slide54.xml><?xml version="1.0" encoding="utf-8"?>
+<p:sld xmlns:a="http://schemas.openxmlformats.org/drawingml/2006/main" xmlns:r="http://schemas.openxmlformats.org/officeDocument/2006/relationships" xmlns:p="http://schemas.openxmlformats.org/presentationml/2006/main">
+  <p:cSld>
+    <p:spTree>
+      <p:nvGrpSpPr>
+        <p:cNvPr id="1" name=""/>
+        <p:cNvGrpSpPr/>
+        <p:nvPr/>
+      </p:nvGrpSpPr>
+      <p:grpSpPr>
+        <a:xfrm>
+          <a:off x="0" y="0"/>
+          <a:ext cx="0" cy="0"/>
+          <a:chOff x="0" y="0"/>
+          <a:chExt cx="0" cy="0"/>
+        </a:xfrm>
+      </p:grpSpPr>
+      <p:sp>
+        <p:nvSpPr>
+          <p:cNvPr id="2" name="Title 1"/>
+          <p:cNvSpPr>
+            <a:spLocks noGrp="1"/>
+          </p:cNvSpPr>
+          <p:nvPr>
+            <p:ph type="title"/>
+          </p:nvPr>
+        </p:nvSpPr>
+        <p:spPr/>
+        <p:txBody>
+          <a:bodyPr/>
+          <a:lstStyle/>
+          <a:p>
+            <a:r>
               <a:rPr lang="en-US" dirty="0" err="1" smtClean="0"/>
               <a:t>Arduino</a:t>
             </a:r>
@@ -31816,7 +32889,7 @@
 </p:sld>
 </file>
 
-<file path=ppt/slides/slide53.xml><?xml version="1.0" encoding="utf-8"?>
+<file path=ppt/slides/slide55.xml><?xml version="1.0" encoding="utf-8"?>
 <p:sld xmlns:a="http://schemas.openxmlformats.org/drawingml/2006/main" xmlns:r="http://schemas.openxmlformats.org/officeDocument/2006/relationships" xmlns:p="http://schemas.openxmlformats.org/presentationml/2006/main">
   <p:cSld>
     <p:spTree>

</xml_diff>

<commit_message>
Update for multi-rate TM
Update for multi-rate TM
</commit_message>
<xml_diff>
--- a/Simulation Outline.pptx
+++ b/Simulation Outline.pptx
@@ -55,11 +55,13 @@
     <p:sldId id="306" r:id="rId49"/>
     <p:sldId id="314" r:id="rId50"/>
     <p:sldId id="313" r:id="rId51"/>
-    <p:sldId id="303" r:id="rId52"/>
-    <p:sldId id="304" r:id="rId53"/>
-    <p:sldId id="305" r:id="rId54"/>
-    <p:sldId id="311" r:id="rId55"/>
-    <p:sldId id="312" r:id="rId56"/>
+    <p:sldId id="316" r:id="rId52"/>
+    <p:sldId id="303" r:id="rId53"/>
+    <p:sldId id="304" r:id="rId54"/>
+    <p:sldId id="305" r:id="rId55"/>
+    <p:sldId id="311" r:id="rId56"/>
+    <p:sldId id="312" r:id="rId57"/>
+    <p:sldId id="315" r:id="rId58"/>
   </p:sldIdLst>
   <p:sldSz cx="9144000" cy="6858000" type="screen4x3"/>
   <p:notesSz cx="6858000" cy="9144000"/>
@@ -342,7 +344,7 @@
           <a:p>
             <a:fld id="{C3FDBE07-93C4-1244-B5BB-C293211E703B}" type="datetimeFigureOut">
               <a:rPr lang="en-US" smtClean="0"/>
-              <a:t>2/18/23</a:t>
+              <a:t>7/23/23</a:t>
             </a:fld>
             <a:endParaRPr lang="en-US"/>
           </a:p>
@@ -512,7 +514,7 @@
           <a:p>
             <a:fld id="{C3FDBE07-93C4-1244-B5BB-C293211E703B}" type="datetimeFigureOut">
               <a:rPr lang="en-US" smtClean="0"/>
-              <a:t>2/18/23</a:t>
+              <a:t>7/23/23</a:t>
             </a:fld>
             <a:endParaRPr lang="en-US"/>
           </a:p>
@@ -692,7 +694,7 @@
           <a:p>
             <a:fld id="{C3FDBE07-93C4-1244-B5BB-C293211E703B}" type="datetimeFigureOut">
               <a:rPr lang="en-US" smtClean="0"/>
-              <a:t>2/18/23</a:t>
+              <a:t>7/23/23</a:t>
             </a:fld>
             <a:endParaRPr lang="en-US"/>
           </a:p>
@@ -862,7 +864,7 @@
           <a:p>
             <a:fld id="{C3FDBE07-93C4-1244-B5BB-C293211E703B}" type="datetimeFigureOut">
               <a:rPr lang="en-US" smtClean="0"/>
-              <a:t>2/18/23</a:t>
+              <a:t>7/23/23</a:t>
             </a:fld>
             <a:endParaRPr lang="en-US"/>
           </a:p>
@@ -1108,7 +1110,7 @@
           <a:p>
             <a:fld id="{C3FDBE07-93C4-1244-B5BB-C293211E703B}" type="datetimeFigureOut">
               <a:rPr lang="en-US" smtClean="0"/>
-              <a:t>2/18/23</a:t>
+              <a:t>7/23/23</a:t>
             </a:fld>
             <a:endParaRPr lang="en-US"/>
           </a:p>
@@ -1396,7 +1398,7 @@
           <a:p>
             <a:fld id="{C3FDBE07-93C4-1244-B5BB-C293211E703B}" type="datetimeFigureOut">
               <a:rPr lang="en-US" smtClean="0"/>
-              <a:t>2/18/23</a:t>
+              <a:t>7/23/23</a:t>
             </a:fld>
             <a:endParaRPr lang="en-US"/>
           </a:p>
@@ -1818,7 +1820,7 @@
           <a:p>
             <a:fld id="{C3FDBE07-93C4-1244-B5BB-C293211E703B}" type="datetimeFigureOut">
               <a:rPr lang="en-US" smtClean="0"/>
-              <a:t>2/18/23</a:t>
+              <a:t>7/23/23</a:t>
             </a:fld>
             <a:endParaRPr lang="en-US"/>
           </a:p>
@@ -1936,7 +1938,7 @@
           <a:p>
             <a:fld id="{C3FDBE07-93C4-1244-B5BB-C293211E703B}" type="datetimeFigureOut">
               <a:rPr lang="en-US" smtClean="0"/>
-              <a:t>2/18/23</a:t>
+              <a:t>7/23/23</a:t>
             </a:fld>
             <a:endParaRPr lang="en-US"/>
           </a:p>
@@ -2031,7 +2033,7 @@
           <a:p>
             <a:fld id="{C3FDBE07-93C4-1244-B5BB-C293211E703B}" type="datetimeFigureOut">
               <a:rPr lang="en-US" smtClean="0"/>
-              <a:t>2/18/23</a:t>
+              <a:t>7/23/23</a:t>
             </a:fld>
             <a:endParaRPr lang="en-US"/>
           </a:p>
@@ -2308,7 +2310,7 @@
           <a:p>
             <a:fld id="{C3FDBE07-93C4-1244-B5BB-C293211E703B}" type="datetimeFigureOut">
               <a:rPr lang="en-US" smtClean="0"/>
-              <a:t>2/18/23</a:t>
+              <a:t>7/23/23</a:t>
             </a:fld>
             <a:endParaRPr lang="en-US"/>
           </a:p>
@@ -2561,7 +2563,7 @@
           <a:p>
             <a:fld id="{C3FDBE07-93C4-1244-B5BB-C293211E703B}" type="datetimeFigureOut">
               <a:rPr lang="en-US" smtClean="0"/>
-              <a:t>2/18/23</a:t>
+              <a:t>7/23/23</a:t>
             </a:fld>
             <a:endParaRPr lang="en-US"/>
           </a:p>
@@ -2774,7 +2776,7 @@
           <a:p>
             <a:fld id="{C3FDBE07-93C4-1244-B5BB-C293211E703B}" type="datetimeFigureOut">
               <a:rPr lang="en-US" smtClean="0"/>
-              <a:t>2/18/23</a:t>
+              <a:t>7/23/23</a:t>
             </a:fld>
             <a:endParaRPr lang="en-US"/>
           </a:p>
@@ -29552,7 +29554,7 @@
           <a:graphicData uri="http://schemas.openxmlformats.org/presentationml/2006/ole">
             <mc:AlternateContent xmlns:mc="http://schemas.openxmlformats.org/markup-compatibility/2006">
               <mc:Choice xmlns:v="urn:schemas-microsoft-com:vml" Requires="v">
-                <p:oleObj spid="_x0000_s1221" name="Equation" r:id="rId3" imgW="1714500" imgH="1638300" progId="Equation.3">
+                <p:oleObj spid="_x0000_s1289" name="Equation" r:id="rId3" imgW="1714500" imgH="1638300" progId="Equation.3">
                   <p:embed/>
                 </p:oleObj>
               </mc:Choice>
@@ -29609,7 +29611,7 @@
           <a:graphicData uri="http://schemas.openxmlformats.org/presentationml/2006/ole">
             <mc:AlternateContent xmlns:mc="http://schemas.openxmlformats.org/markup-compatibility/2006">
               <mc:Choice xmlns:v="urn:schemas-microsoft-com:vml" Requires="v">
-                <p:oleObj spid="_x0000_s1222" name="Equation" r:id="rId5" imgW="2044700" imgH="292100" progId="Equation.3">
+                <p:oleObj spid="_x0000_s1290" name="Equation" r:id="rId5" imgW="2044700" imgH="292100" progId="Equation.3">
                   <p:embed/>
                 </p:oleObj>
               </mc:Choice>
@@ -31442,6 +31444,10 @@
           <a:bodyPr/>
           <a:lstStyle/>
           <a:p>
+            <a:r>
+              <a:rPr lang="en-US" dirty="0" smtClean="0"/>
+              <a:t>Hardware Power</a:t>
+            </a:r>
             <a:endParaRPr lang="en-US" dirty="0"/>
           </a:p>
         </p:txBody>
@@ -31456,14 +31462,14 @@
             <p:ph idx="1"/>
             <p:extLst>
               <p:ext uri="{D42A27DB-BD31-4B8C-83A1-F6EECF244321}">
-                <p14:modId xmlns:p14="http://schemas.microsoft.com/office/powerpoint/2010/main" val="3354637630"/>
+                <p14:modId xmlns:p14="http://schemas.microsoft.com/office/powerpoint/2010/main" val="1437878634"/>
               </p:ext>
             </p:extLst>
           </p:nvPr>
         </p:nvGraphicFramePr>
         <p:xfrm>
           <a:off x="457200" y="1791290"/>
-          <a:ext cx="8229599" cy="3596640"/>
+          <a:ext cx="8229599" cy="4424680"/>
         </p:xfrm>
         <a:graphic>
           <a:graphicData uri="http://schemas.openxmlformats.org/drawingml/2006/table">
@@ -32052,7 +32058,19 @@
                     <a:p>
                       <a:r>
                         <a:rPr lang="en-US" sz="1200" dirty="0" smtClean="0"/>
-                        <a:t> (3.3x0.032) 0.1056W</a:t>
+                        <a:t> (</a:t>
+                      </a:r>
+                      <a:r>
+                        <a:rPr lang="en-US" sz="1200" dirty="0" smtClean="0"/>
+                        <a:t>3.3x0.0032</a:t>
+                      </a:r>
+                      <a:r>
+                        <a:rPr lang="en-US" sz="1200" dirty="0" smtClean="0"/>
+                        <a:t>) </a:t>
+                      </a:r>
+                      <a:r>
+                        <a:rPr lang="en-US" sz="1200" dirty="0" smtClean="0"/>
+                        <a:t>0.01056W</a:t>
                       </a:r>
                       <a:endParaRPr lang="en-US" sz="1200" dirty="0"/>
                     </a:p>
@@ -32119,7 +32137,7 @@
                     <a:lstStyle/>
                     <a:p>
                       <a:r>
-                        <a:rPr lang="en-US" sz="1200" smtClean="0"/>
+                        <a:rPr lang="en-US" sz="1200" dirty="0" smtClean="0"/>
                         <a:t>3.6-5.5V</a:t>
                       </a:r>
                       <a:endParaRPr lang="en-US" sz="1200" dirty="0"/>
@@ -32352,6 +32370,170 @@
                   <a:tcPr/>
                 </a:tc>
               </a:tr>
+              <a:tr h="370840">
+                <a:tc>
+                  <a:txBody>
+                    <a:bodyPr/>
+                    <a:lstStyle/>
+                    <a:p>
+                      <a:r>
+                        <a:rPr lang="en-US" sz="1200" dirty="0" smtClean="0"/>
+                        <a:t>ESC (x4)</a:t>
+                      </a:r>
+                      <a:endParaRPr lang="en-US" sz="1200" dirty="0"/>
+                    </a:p>
+                  </a:txBody>
+                  <a:tcPr/>
+                </a:tc>
+                <a:tc>
+                  <a:txBody>
+                    <a:bodyPr/>
+                    <a:lstStyle/>
+                    <a:p>
+                      <a:endParaRPr lang="en-US" sz="1200" dirty="0"/>
+                    </a:p>
+                  </a:txBody>
+                  <a:tcPr/>
+                </a:tc>
+                <a:tc>
+                  <a:txBody>
+                    <a:bodyPr/>
+                    <a:lstStyle/>
+                    <a:p>
+                      <a:r>
+                        <a:rPr lang="en-US" sz="1200" dirty="0" smtClean="0"/>
+                        <a:t>7.4-22.2 in,  5V out</a:t>
+                      </a:r>
+                      <a:endParaRPr lang="en-US" sz="1200" dirty="0"/>
+                    </a:p>
+                  </a:txBody>
+                  <a:tcPr/>
+                </a:tc>
+                <a:tc>
+                  <a:txBody>
+                    <a:bodyPr/>
+                    <a:lstStyle/>
+                    <a:p>
+                      <a:r>
+                        <a:rPr lang="en-US" sz="1200" dirty="0" smtClean="0"/>
+                        <a:t>2A output</a:t>
+                      </a:r>
+                      <a:endParaRPr lang="en-US" sz="1200" dirty="0"/>
+                    </a:p>
+                  </a:txBody>
+                  <a:tcPr/>
+                </a:tc>
+                <a:tc>
+                  <a:txBody>
+                    <a:bodyPr/>
+                    <a:lstStyle/>
+                    <a:p>
+                      <a:endParaRPr lang="en-US" sz="1200" dirty="0"/>
+                    </a:p>
+                  </a:txBody>
+                  <a:tcPr/>
+                </a:tc>
+                <a:tc>
+                  <a:txBody>
+                    <a:bodyPr/>
+                    <a:lstStyle/>
+                    <a:p>
+                      <a:endParaRPr lang="en-US" sz="1200" dirty="0"/>
+                    </a:p>
+                  </a:txBody>
+                  <a:tcPr/>
+                </a:tc>
+                <a:tc>
+                  <a:txBody>
+                    <a:bodyPr/>
+                    <a:lstStyle/>
+                    <a:p>
+                      <a:endParaRPr lang="en-US" sz="1200" dirty="0"/>
+                    </a:p>
+                  </a:txBody>
+                  <a:tcPr/>
+                </a:tc>
+              </a:tr>
+              <a:tr h="370840">
+                <a:tc>
+                  <a:txBody>
+                    <a:bodyPr/>
+                    <a:lstStyle/>
+                    <a:p>
+                      <a:r>
+                        <a:rPr lang="en-US" sz="1200" dirty="0" smtClean="0"/>
+                        <a:t>Motor (x4)</a:t>
+                      </a:r>
+                      <a:endParaRPr lang="en-US" sz="1200" dirty="0"/>
+                    </a:p>
+                  </a:txBody>
+                  <a:tcPr/>
+                </a:tc>
+                <a:tc>
+                  <a:txBody>
+                    <a:bodyPr/>
+                    <a:lstStyle/>
+                    <a:p>
+                      <a:endParaRPr lang="en-US" sz="1200" dirty="0"/>
+                    </a:p>
+                  </a:txBody>
+                  <a:tcPr/>
+                </a:tc>
+                <a:tc>
+                  <a:txBody>
+                    <a:bodyPr/>
+                    <a:lstStyle/>
+                    <a:p>
+                      <a:r>
+                        <a:rPr lang="en-US" sz="1200" dirty="0" smtClean="0"/>
+                        <a:t>7-12</a:t>
+                      </a:r>
+                      <a:endParaRPr lang="en-US" sz="1200" dirty="0"/>
+                    </a:p>
+                  </a:txBody>
+                  <a:tcPr/>
+                </a:tc>
+                <a:tc>
+                  <a:txBody>
+                    <a:bodyPr/>
+                    <a:lstStyle/>
+                    <a:p>
+                      <a:endParaRPr lang="en-US" sz="1200" dirty="0"/>
+                    </a:p>
+                  </a:txBody>
+                  <a:tcPr/>
+                </a:tc>
+                <a:tc>
+                  <a:txBody>
+                    <a:bodyPr/>
+                    <a:lstStyle/>
+                    <a:p>
+                      <a:endParaRPr lang="en-US" sz="1200" dirty="0"/>
+                    </a:p>
+                  </a:txBody>
+                  <a:tcPr/>
+                </a:tc>
+                <a:tc>
+                  <a:txBody>
+                    <a:bodyPr/>
+                    <a:lstStyle/>
+                    <a:p>
+                      <a:endParaRPr lang="en-US" sz="1200" dirty="0"/>
+                    </a:p>
+                  </a:txBody>
+                  <a:tcPr/>
+                </a:tc>
+                <a:tc>
+                  <a:txBody>
+                    <a:bodyPr/>
+                    <a:lstStyle/>
+                    <a:p>
+                      <a:endParaRPr lang="en-US" sz="1200" dirty="0"/>
+                    </a:p>
+                  </a:txBody>
+                  <a:tcPr/>
+                </a:tc>
+              </a:tr>
             </a:tbl>
           </a:graphicData>
         </a:graphic>
@@ -32364,8 +32546,8 @@
         </p:nvSpPr>
         <p:spPr>
           <a:xfrm>
-            <a:off x="1344083" y="5556250"/>
-            <a:ext cx="3131837" cy="646331"/>
+            <a:off x="457200" y="6211669"/>
+            <a:ext cx="3339376" cy="646331"/>
           </a:xfrm>
           <a:prstGeom prst="rect">
             <a:avLst/>
@@ -32386,13 +32568,9 @@
           <a:p>
             <a:r>
               <a:rPr lang="en-US" dirty="0" smtClean="0"/>
-              <a:t>Ground </a:t>
-            </a:r>
-            <a:r>
-              <a:rPr lang="en-US" smtClean="0"/>
-              <a:t>Station Power = 1.5305</a:t>
-            </a:r>
-            <a:endParaRPr lang="en-US"/>
+              <a:t>Ground Station Power = 1.5305W</a:t>
+            </a:r>
+            <a:endParaRPr lang="en-US" dirty="0"/>
           </a:p>
         </p:txBody>
       </p:sp>
@@ -32438,36 +32616,403 @@
         </p:nvSpPr>
         <p:spPr/>
         <p:txBody>
-          <a:bodyPr/>
+          <a:bodyPr>
+            <a:normAutofit/>
+          </a:bodyPr>
           <a:lstStyle/>
           <a:p>
             <a:r>
               <a:rPr lang="en-US" dirty="0" smtClean="0"/>
-              <a:t>Ground Station</a:t>
+              <a:t>Teensy 4.0 Resistors</a:t>
             </a:r>
             <a:endParaRPr lang="en-US" dirty="0"/>
           </a:p>
         </p:txBody>
       </p:sp>
-      <p:sp>
-        <p:nvSpPr>
-          <p:cNvPr id="3" name="Text Placeholder 2"/>
-          <p:cNvSpPr>
-            <a:spLocks noGrp="1"/>
-          </p:cNvSpPr>
+      <p:graphicFrame>
+        <p:nvGraphicFramePr>
+          <p:cNvPr id="4" name="Table 3"/>
+          <p:cNvGraphicFramePr>
+            <a:graphicFrameLocks noGrp="1"/>
+          </p:cNvGraphicFramePr>
           <p:nvPr>
-            <p:ph type="body" idx="1"/>
+            <p:extLst>
+              <p:ext uri="{D42A27DB-BD31-4B8C-83A1-F6EECF244321}">
+                <p14:modId xmlns:p14="http://schemas.microsoft.com/office/powerpoint/2010/main" val="4245344223"/>
+              </p:ext>
+            </p:extLst>
           </p:nvPr>
-        </p:nvSpPr>
-        <p:spPr/>
-        <p:txBody>
-          <a:bodyPr/>
+        </p:nvGraphicFramePr>
+        <p:xfrm>
+          <a:off x="105843" y="1397000"/>
+          <a:ext cx="8845374" cy="2123440"/>
+        </p:xfrm>
+        <a:graphic>
+          <a:graphicData uri="http://schemas.openxmlformats.org/drawingml/2006/table">
+            <a:tbl>
+              <a:tblPr firstRow="1" bandRow="1">
+                <a:tableStyleId>{5C22544A-7EE6-4342-B048-85BDC9FD1C3A}</a:tableStyleId>
+              </a:tblPr>
+              <a:tblGrid>
+                <a:gridCol w="1663232"/>
+                <a:gridCol w="3432308"/>
+                <a:gridCol w="3749834"/>
+              </a:tblGrid>
+              <a:tr h="370840">
+                <a:tc>
+                  <a:txBody>
+                    <a:bodyPr/>
+                    <a:lstStyle/>
+                    <a:p>
+                      <a:r>
+                        <a:rPr lang="en-US" dirty="0" smtClean="0"/>
+                        <a:t>Description</a:t>
+                      </a:r>
+                      <a:endParaRPr lang="en-US" dirty="0"/>
+                    </a:p>
+                  </a:txBody>
+                  <a:tcPr/>
+                </a:tc>
+                <a:tc>
+                  <a:txBody>
+                    <a:bodyPr/>
+                    <a:lstStyle/>
+                    <a:p>
+                      <a:r>
+                        <a:rPr lang="en-US" dirty="0" smtClean="0"/>
+                        <a:t>Resistor</a:t>
+                      </a:r>
+                      <a:endParaRPr lang="en-US" dirty="0"/>
+                    </a:p>
+                  </a:txBody>
+                  <a:tcPr/>
+                </a:tc>
+                <a:tc>
+                  <a:txBody>
+                    <a:bodyPr/>
+                    <a:lstStyle/>
+                    <a:p>
+                      <a:r>
+                        <a:rPr lang="en-US" dirty="0" smtClean="0"/>
+                        <a:t>Connection</a:t>
+                      </a:r>
+                      <a:endParaRPr lang="en-US" dirty="0"/>
+                    </a:p>
+                  </a:txBody>
+                  <a:tcPr/>
+                </a:tc>
+              </a:tr>
+              <a:tr h="370840">
+                <a:tc>
+                  <a:txBody>
+                    <a:bodyPr/>
+                    <a:lstStyle/>
+                    <a:p>
+                      <a:r>
+                        <a:rPr lang="en-US" dirty="0" smtClean="0"/>
+                        <a:t>I2C</a:t>
+                      </a:r>
+                      <a:r>
+                        <a:rPr lang="en-US" baseline="0" dirty="0" smtClean="0"/>
+                        <a:t> SCA </a:t>
+                      </a:r>
+                      <a:r>
+                        <a:rPr lang="en-US" baseline="0" dirty="0" err="1" smtClean="0"/>
+                        <a:t>Pullup</a:t>
+                      </a:r>
+                      <a:endParaRPr lang="en-US" dirty="0"/>
+                    </a:p>
+                  </a:txBody>
+                  <a:tcPr/>
+                </a:tc>
+                <a:tc>
+                  <a:txBody>
+                    <a:bodyPr/>
+                    <a:lstStyle/>
+                    <a:p>
+                      <a:r>
+                        <a:rPr lang="en-US" dirty="0" smtClean="0"/>
+                        <a:t>1.0-4.7</a:t>
+                      </a:r>
+                      <a:r>
+                        <a:rPr lang="en-US" baseline="0" dirty="0" smtClean="0"/>
+                        <a:t> </a:t>
+                      </a:r>
+                      <a:r>
+                        <a:rPr lang="en-US" baseline="0" dirty="0" err="1" smtClean="0"/>
+                        <a:t>kOhm</a:t>
+                      </a:r>
+                      <a:r>
+                        <a:rPr lang="en-US" baseline="0" dirty="0" smtClean="0"/>
+                        <a:t> (1.0kOhm applied)</a:t>
+                      </a:r>
+                      <a:endParaRPr lang="en-US" dirty="0"/>
+                    </a:p>
+                  </a:txBody>
+                  <a:tcPr/>
+                </a:tc>
+                <a:tc>
+                  <a:txBody>
+                    <a:bodyPr/>
+                    <a:lstStyle/>
+                    <a:p>
+                      <a:r>
+                        <a:rPr lang="en-US" dirty="0" smtClean="0"/>
+                        <a:t>SCA</a:t>
+                      </a:r>
+                      <a:r>
+                        <a:rPr lang="en-US" baseline="0" dirty="0" smtClean="0"/>
+                        <a:t> </a:t>
+                      </a:r>
+                      <a:r>
+                        <a:rPr lang="en-US" dirty="0" smtClean="0"/>
+                        <a:t>to power</a:t>
+                      </a:r>
+                      <a:endParaRPr lang="en-US" dirty="0"/>
+                    </a:p>
+                  </a:txBody>
+                  <a:tcPr/>
+                </a:tc>
+              </a:tr>
+              <a:tr h="370840">
+                <a:tc>
+                  <a:txBody>
+                    <a:bodyPr/>
+                    <a:lstStyle/>
+                    <a:p>
+                      <a:r>
+                        <a:rPr lang="en-US" dirty="0" smtClean="0"/>
+                        <a:t>I2C</a:t>
+                      </a:r>
+                      <a:r>
+                        <a:rPr lang="en-US" baseline="0" dirty="0" smtClean="0"/>
+                        <a:t> SCL </a:t>
+                      </a:r>
+                      <a:r>
+                        <a:rPr lang="en-US" baseline="0" dirty="0" err="1" smtClean="0"/>
+                        <a:t>Pullup</a:t>
+                      </a:r>
+                      <a:endParaRPr lang="en-US" dirty="0"/>
+                    </a:p>
+                  </a:txBody>
+                  <a:tcPr/>
+                </a:tc>
+                <a:tc>
+                  <a:txBody>
+                    <a:bodyPr/>
+                    <a:lstStyle/>
+                    <a:p>
+                      <a:r>
+                        <a:rPr lang="en-US" dirty="0" smtClean="0"/>
+                        <a:t>1.0-4.7kOhm </a:t>
+                      </a:r>
+                      <a:r>
+                        <a:rPr lang="en-US" baseline="0" dirty="0" smtClean="0"/>
+                        <a:t>(1.0kOhm applied)</a:t>
+                      </a:r>
+                      <a:endParaRPr lang="en-US" dirty="0"/>
+                    </a:p>
+                  </a:txBody>
+                  <a:tcPr/>
+                </a:tc>
+                <a:tc>
+                  <a:txBody>
+                    <a:bodyPr/>
+                    <a:lstStyle/>
+                    <a:p>
+                      <a:r>
+                        <a:rPr lang="en-US" dirty="0" smtClean="0"/>
+                        <a:t>SCL to power</a:t>
+                      </a:r>
+                      <a:endParaRPr lang="en-US" dirty="0"/>
+                    </a:p>
+                  </a:txBody>
+                  <a:tcPr/>
+                </a:tc>
+              </a:tr>
+              <a:tr h="370840">
+                <a:tc>
+                  <a:txBody>
+                    <a:bodyPr/>
+                    <a:lstStyle/>
+                    <a:p>
+                      <a:r>
+                        <a:rPr lang="en-US" dirty="0" smtClean="0"/>
+                        <a:t>APC220 TX (R1)</a:t>
+                      </a:r>
+                      <a:endParaRPr lang="en-US" dirty="0"/>
+                    </a:p>
+                  </a:txBody>
+                  <a:tcPr/>
+                </a:tc>
+                <a:tc>
+                  <a:txBody>
+                    <a:bodyPr/>
+                    <a:lstStyle/>
+                    <a:p>
+                      <a:r>
+                        <a:rPr lang="en-US" dirty="0" smtClean="0"/>
+                        <a:t>1.0kOhm (brown left)</a:t>
+                      </a:r>
+                      <a:endParaRPr lang="en-US" dirty="0"/>
+                    </a:p>
+                  </a:txBody>
+                  <a:tcPr/>
+                </a:tc>
+                <a:tc>
+                  <a:txBody>
+                    <a:bodyPr/>
+                    <a:lstStyle/>
+                    <a:p>
+                      <a:r>
+                        <a:rPr lang="en-US" dirty="0" smtClean="0"/>
+                        <a:t>APC220 TX to Teensy 4.0 Serail2 RX (7)</a:t>
+                      </a:r>
+                      <a:endParaRPr lang="en-US" dirty="0"/>
+                    </a:p>
+                  </a:txBody>
+                  <a:tcPr/>
+                </a:tc>
+              </a:tr>
+              <a:tr h="370840">
+                <a:tc>
+                  <a:txBody>
+                    <a:bodyPr/>
+                    <a:lstStyle/>
+                    <a:p>
+                      <a:r>
+                        <a:rPr lang="en-US" dirty="0" smtClean="0"/>
+                        <a:t>APC220 TX (R2)</a:t>
+                      </a:r>
+                      <a:endParaRPr lang="en-US" dirty="0"/>
+                    </a:p>
+                  </a:txBody>
+                  <a:tcPr/>
+                </a:tc>
+                <a:tc>
+                  <a:txBody>
+                    <a:bodyPr/>
+                    <a:lstStyle/>
+                    <a:p>
+                      <a:r>
+                        <a:rPr lang="en-US" smtClean="0"/>
+                        <a:t>2.0kOhm (red </a:t>
+                      </a:r>
+                      <a:r>
+                        <a:rPr lang="en-US" dirty="0" smtClean="0"/>
+                        <a:t>left)</a:t>
+                      </a:r>
+                      <a:endParaRPr lang="en-US" dirty="0"/>
+                    </a:p>
+                  </a:txBody>
+                  <a:tcPr/>
+                </a:tc>
+                <a:tc>
+                  <a:txBody>
+                    <a:bodyPr/>
+                    <a:lstStyle/>
+                    <a:p>
+                      <a:r>
+                        <a:rPr lang="en-US" dirty="0" smtClean="0"/>
+                        <a:t>APC220 TX to ground</a:t>
+                      </a:r>
+                      <a:endParaRPr lang="en-US" dirty="0"/>
+                    </a:p>
+                  </a:txBody>
+                  <a:tcPr/>
+                </a:tc>
+              </a:tr>
+            </a:tbl>
+          </a:graphicData>
+        </a:graphic>
+      </p:graphicFrame>
+      <p:sp>
+        <p:nvSpPr>
+          <p:cNvPr id="5" name="TextBox 4"/>
+          <p:cNvSpPr txBox="1"/>
+          <p:nvPr/>
+        </p:nvSpPr>
+        <p:spPr>
+          <a:xfrm>
+            <a:off x="196564" y="3840026"/>
+            <a:ext cx="4083169" cy="1477328"/>
+          </a:xfrm>
+          <a:prstGeom prst="rect">
+            <a:avLst/>
+          </a:prstGeom>
+          <a:noFill/>
+        </p:spPr>
+        <p:txBody>
+          <a:bodyPr wrap="none" rtlCol="0">
+            <a:spAutoFit/>
+          </a:bodyPr>
           <a:lstStyle/>
           <a:p>
             <a:r>
-              <a:rPr lang="en-US" dirty="0" smtClean="0"/>
-              <a:t>Ground Station</a:t>
-            </a:r>
+              <a:rPr lang="en-US" dirty="0" err="1" smtClean="0"/>
+              <a:t>Vout</a:t>
+            </a:r>
+            <a:r>
+              <a:rPr lang="en-US" dirty="0" smtClean="0"/>
+              <a:t> = Vin * R2/(R1 + R2)</a:t>
+            </a:r>
+          </a:p>
+          <a:p>
+            <a:pPr marL="285750" indent="-285750">
+              <a:buFont typeface="Arial"/>
+              <a:buChar char="•"/>
+            </a:pPr>
+            <a:r>
+              <a:rPr lang="en-US" dirty="0" smtClean="0"/>
+              <a:t>For Vin = 5v, </a:t>
+            </a:r>
+            <a:r>
+              <a:rPr lang="en-US" dirty="0" err="1" smtClean="0"/>
+              <a:t>Vout</a:t>
+            </a:r>
+            <a:r>
+              <a:rPr lang="en-US" dirty="0" smtClean="0"/>
+              <a:t> = 3.3V: </a:t>
+            </a:r>
+            <a:r>
+              <a:rPr lang="en-US" dirty="0" smtClean="0"/>
+              <a:t>R1 </a:t>
+            </a:r>
+            <a:r>
+              <a:rPr lang="en-US" dirty="0" smtClean="0"/>
+              <a:t>= 0.5 * </a:t>
+            </a:r>
+            <a:r>
+              <a:rPr lang="en-US" dirty="0" smtClean="0"/>
+              <a:t>R2</a:t>
+            </a:r>
+            <a:endParaRPr lang="en-US" dirty="0" smtClean="0"/>
+          </a:p>
+          <a:p>
+            <a:pPr marL="285750" indent="-285750">
+              <a:buFont typeface="Arial"/>
+              <a:buChar char="•"/>
+            </a:pPr>
+            <a:r>
+              <a:rPr lang="en-US" dirty="0" smtClean="0"/>
+              <a:t>R1 from Vin to destination</a:t>
+            </a:r>
+          </a:p>
+          <a:p>
+            <a:pPr marL="285750" indent="-285750">
+              <a:buFont typeface="Arial"/>
+              <a:buChar char="•"/>
+            </a:pPr>
+            <a:r>
+              <a:rPr lang="en-US" dirty="0" smtClean="0"/>
+              <a:t>R2 is connected from Vin to ground</a:t>
+            </a:r>
+          </a:p>
+          <a:p>
+            <a:pPr marL="285750" indent="-285750">
+              <a:buFont typeface="Arial"/>
+              <a:buChar char="•"/>
+            </a:pPr>
             <a:endParaRPr lang="en-US" dirty="0"/>
           </a:p>
         </p:txBody>
@@ -32475,7 +33020,7 @@
     </p:spTree>
     <p:extLst>
       <p:ext uri="{BB962C8B-B14F-4D97-AF65-F5344CB8AC3E}">
-        <p14:creationId xmlns:p14="http://schemas.microsoft.com/office/powerpoint/2010/main" val="3317073900"/>
+        <p14:creationId xmlns:p14="http://schemas.microsoft.com/office/powerpoint/2010/main" val="695662777"/>
       </p:ext>
     </p:extLst>
   </p:cSld>
@@ -32519,7 +33064,7 @@
           <a:p>
             <a:r>
               <a:rPr lang="en-US" dirty="0" smtClean="0"/>
-              <a:t>Options</a:t>
+              <a:t>Ground Station</a:t>
             </a:r>
             <a:endParaRPr lang="en-US" dirty="0"/>
           </a:p>
@@ -32527,90 +33072,22 @@
       </p:sp>
       <p:sp>
         <p:nvSpPr>
-          <p:cNvPr id="3" name="Content Placeholder 2"/>
+          <p:cNvPr id="3" name="Text Placeholder 2"/>
           <p:cNvSpPr>
             <a:spLocks noGrp="1"/>
           </p:cNvSpPr>
           <p:nvPr>
-            <p:ph idx="1"/>
+            <p:ph type="body" idx="1"/>
           </p:nvPr>
         </p:nvSpPr>
         <p:spPr/>
         <p:txBody>
-          <a:bodyPr>
-            <a:normAutofit lnSpcReduction="10000"/>
-          </a:bodyPr>
+          <a:bodyPr/>
           <a:lstStyle/>
           <a:p>
             <a:r>
               <a:rPr lang="en-US" dirty="0" smtClean="0"/>
-              <a:t>Needs</a:t>
-            </a:r>
-          </a:p>
-          <a:p>
-            <a:pPr lvl="1"/>
-            <a:r>
-              <a:rPr lang="en-US" dirty="0" smtClean="0"/>
-              <a:t>Monitor data (whole flight)</a:t>
-            </a:r>
-          </a:p>
-          <a:p>
-            <a:pPr lvl="1"/>
-            <a:r>
-              <a:rPr lang="en-US" dirty="0" smtClean="0"/>
-              <a:t>Send data (close range) (future), </a:t>
-            </a:r>
-            <a:r>
-              <a:rPr lang="en-US" dirty="0" err="1" smtClean="0"/>
-              <a:t>bluetooth</a:t>
-            </a:r>
-            <a:endParaRPr lang="en-US" dirty="0" smtClean="0"/>
-          </a:p>
-          <a:p>
-            <a:pPr lvl="1"/>
-            <a:r>
-              <a:rPr lang="en-US" dirty="0" err="1" smtClean="0"/>
-              <a:t>Wifi</a:t>
-            </a:r>
-            <a:r>
-              <a:rPr lang="en-US" dirty="0" smtClean="0"/>
-              <a:t> connection for GPS, </a:t>
-            </a:r>
-            <a:r>
-              <a:rPr lang="en-US" dirty="0" err="1" smtClean="0"/>
-              <a:t>bluetooth</a:t>
-            </a:r>
-            <a:endParaRPr lang="en-US" dirty="0" smtClean="0"/>
-          </a:p>
-          <a:p>
-            <a:pPr lvl="1"/>
-            <a:endParaRPr lang="en-US" dirty="0" smtClean="0"/>
-          </a:p>
-          <a:p>
-            <a:r>
-              <a:rPr lang="en-US" dirty="0" smtClean="0"/>
-              <a:t>Options</a:t>
-            </a:r>
-          </a:p>
-          <a:p>
-            <a:pPr lvl="1"/>
-            <a:r>
-              <a:rPr lang="en-US" dirty="0" smtClean="0"/>
-              <a:t>Telemetry</a:t>
-            </a:r>
-          </a:p>
-          <a:p>
-            <a:pPr lvl="1"/>
-            <a:r>
-              <a:rPr lang="en-US" dirty="0" smtClean="0"/>
-              <a:t>Bluetooth</a:t>
-            </a:r>
-          </a:p>
-          <a:p>
-            <a:pPr lvl="1"/>
-            <a:r>
-              <a:rPr lang="en-US" dirty="0" err="1" smtClean="0"/>
-              <a:t>Wifi</a:t>
+              <a:t>Ground Station</a:t>
             </a:r>
             <a:endParaRPr lang="en-US" dirty="0"/>
           </a:p>
@@ -32619,7 +33096,7 @@
     </p:spTree>
     <p:extLst>
       <p:ext uri="{BB962C8B-B14F-4D97-AF65-F5344CB8AC3E}">
-        <p14:creationId xmlns:p14="http://schemas.microsoft.com/office/powerpoint/2010/main" val="2340551577"/>
+        <p14:creationId xmlns:p14="http://schemas.microsoft.com/office/powerpoint/2010/main" val="3317073900"/>
       </p:ext>
     </p:extLst>
   </p:cSld>
@@ -32663,7 +33140,7 @@
           <a:p>
             <a:r>
               <a:rPr lang="en-US" dirty="0" smtClean="0"/>
-              <a:t>Architecture</a:t>
+              <a:t>Options</a:t>
             </a:r>
             <a:endParaRPr lang="en-US" dirty="0"/>
           </a:p>
@@ -32681,51 +33158,81 @@
         </p:nvSpPr>
         <p:spPr/>
         <p:txBody>
-          <a:bodyPr/>
+          <a:bodyPr>
+            <a:normAutofit lnSpcReduction="10000"/>
+          </a:bodyPr>
           <a:lstStyle/>
           <a:p>
             <a:r>
               <a:rPr lang="en-US" dirty="0" smtClean="0"/>
-              <a:t>Drone has telemetry receiver (and RC receiver)</a:t>
-            </a:r>
-          </a:p>
-          <a:p>
-            <a:r>
-              <a:rPr lang="en-US" dirty="0" smtClean="0"/>
-              <a:t>Ground station has </a:t>
+              <a:t>Needs</a:t>
+            </a:r>
+          </a:p>
+          <a:p>
+            <a:pPr lvl="1"/>
+            <a:r>
+              <a:rPr lang="en-US" dirty="0" smtClean="0"/>
+              <a:t>Monitor data (whole flight)</a:t>
+            </a:r>
+          </a:p>
+          <a:p>
+            <a:pPr lvl="1"/>
+            <a:r>
+              <a:rPr lang="en-US" dirty="0" smtClean="0"/>
+              <a:t>Send data (close range) (future), </a:t>
             </a:r>
             <a:r>
               <a:rPr lang="en-US" dirty="0" err="1" smtClean="0"/>
               <a:t>bluetooth</a:t>
             </a:r>
-            <a:r>
-              <a:rPr lang="en-US" dirty="0" smtClean="0"/>
-              <a:t> and transmitter</a:t>
-            </a:r>
+            <a:endParaRPr lang="en-US" dirty="0" smtClean="0"/>
           </a:p>
           <a:p>
             <a:pPr lvl="1"/>
             <a:r>
-              <a:rPr lang="en-US" dirty="0" smtClean="0"/>
-              <a:t>Future: use as RC transmitter also</a:t>
-            </a:r>
-          </a:p>
-          <a:p>
-            <a:r>
-              <a:rPr lang="en-US" dirty="0" smtClean="0"/>
-              <a:t>Computer/iPhone app connects to ground station through </a:t>
+              <a:rPr lang="en-US" dirty="0" err="1" smtClean="0"/>
+              <a:t>Wifi</a:t>
+            </a:r>
+            <a:r>
+              <a:rPr lang="en-US" dirty="0" smtClean="0"/>
+              <a:t> connection for GPS, </a:t>
             </a:r>
             <a:r>
               <a:rPr lang="en-US" dirty="0" err="1" smtClean="0"/>
               <a:t>bluetooth</a:t>
             </a:r>
-            <a:r>
-              <a:rPr lang="en-US" smtClean="0"/>
-              <a:t>.</a:t>
-            </a:r>
             <a:endParaRPr lang="en-US" dirty="0" smtClean="0"/>
           </a:p>
           <a:p>
+            <a:pPr lvl="1"/>
+            <a:endParaRPr lang="en-US" dirty="0" smtClean="0"/>
+          </a:p>
+          <a:p>
+            <a:r>
+              <a:rPr lang="en-US" dirty="0" smtClean="0"/>
+              <a:t>Options</a:t>
+            </a:r>
+          </a:p>
+          <a:p>
+            <a:pPr lvl="1"/>
+            <a:r>
+              <a:rPr lang="en-US" dirty="0" smtClean="0"/>
+              <a:t>Telemetry</a:t>
+            </a:r>
+          </a:p>
+          <a:p>
+            <a:pPr lvl="1"/>
+            <a:r>
+              <a:rPr lang="en-US" dirty="0" smtClean="0"/>
+              <a:t>Bluetooth</a:t>
+            </a:r>
+          </a:p>
+          <a:p>
+            <a:pPr lvl="1"/>
+            <a:r>
+              <a:rPr lang="en-US" dirty="0" err="1" smtClean="0"/>
+              <a:t>Wifi</a:t>
+            </a:r>
             <a:endParaRPr lang="en-US" dirty="0"/>
           </a:p>
         </p:txBody>
@@ -32733,7 +33240,7 @@
     </p:spTree>
     <p:extLst>
       <p:ext uri="{BB962C8B-B14F-4D97-AF65-F5344CB8AC3E}">
-        <p14:creationId xmlns:p14="http://schemas.microsoft.com/office/powerpoint/2010/main" val="891112083"/>
+        <p14:creationId xmlns:p14="http://schemas.microsoft.com/office/powerpoint/2010/main" val="2340551577"/>
       </p:ext>
     </p:extLst>
   </p:cSld>
@@ -32776,12 +33283,8 @@
           <a:lstStyle/>
           <a:p>
             <a:r>
-              <a:rPr lang="en-US" dirty="0" err="1" smtClean="0"/>
-              <a:t>Arduino</a:t>
-            </a:r>
-            <a:r>
-              <a:rPr lang="en-US" dirty="0" smtClean="0"/>
-              <a:t> Nano SPI</a:t>
+              <a:rPr lang="en-US" dirty="0" smtClean="0"/>
+              <a:t>Architecture</a:t>
             </a:r>
             <a:endParaRPr lang="en-US" dirty="0"/>
           </a:p>
@@ -32804,72 +33307,44 @@
           <a:p>
             <a:r>
               <a:rPr lang="en-US" dirty="0" smtClean="0"/>
-              <a:t>MISO </a:t>
-            </a:r>
-            <a:r>
-              <a:rPr lang="mr-IN" dirty="0" smtClean="0"/>
-              <a:t>–</a:t>
-            </a:r>
-            <a:r>
-              <a:rPr lang="en-US" dirty="0" smtClean="0"/>
-              <a:t> 12</a:t>
-            </a:r>
-          </a:p>
-          <a:p>
-            <a:r>
-              <a:rPr lang="en-US" dirty="0" smtClean="0"/>
-              <a:t>MOSI </a:t>
-            </a:r>
-            <a:r>
-              <a:rPr lang="mr-IN" dirty="0" smtClean="0"/>
-              <a:t>–</a:t>
-            </a:r>
-            <a:r>
-              <a:rPr lang="en-US" dirty="0" smtClean="0"/>
-              <a:t> 11</a:t>
-            </a:r>
-          </a:p>
-          <a:p>
-            <a:r>
-              <a:rPr lang="en-US" dirty="0" smtClean="0"/>
-              <a:t>SCK </a:t>
-            </a:r>
-            <a:r>
-              <a:rPr lang="mr-IN" dirty="0" smtClean="0"/>
-              <a:t>–</a:t>
-            </a:r>
-            <a:r>
-              <a:rPr lang="en-US" dirty="0" smtClean="0"/>
-              <a:t> 13</a:t>
-            </a:r>
-          </a:p>
-          <a:p>
-            <a:r>
-              <a:rPr lang="en-US" dirty="0" smtClean="0"/>
-              <a:t>CE </a:t>
-            </a:r>
-            <a:r>
-              <a:rPr lang="mr-IN" dirty="0" smtClean="0"/>
-              <a:t>–</a:t>
-            </a:r>
-            <a:r>
-              <a:rPr lang="en-US" dirty="0" smtClean="0"/>
-              <a:t> 9</a:t>
-            </a:r>
-          </a:p>
-          <a:p>
-            <a:r>
-              <a:rPr lang="en-US" dirty="0" smtClean="0"/>
-              <a:t>CSN </a:t>
-            </a:r>
-            <a:r>
-              <a:rPr lang="mr-IN" dirty="0" smtClean="0"/>
-              <a:t>–</a:t>
-            </a:r>
-            <a:r>
-              <a:rPr lang="en-US" dirty="0" smtClean="0"/>
-              <a:t> 10</a:t>
-            </a:r>
+              <a:t>Drone has telemetry receiver (and RC receiver)</a:t>
+            </a:r>
+          </a:p>
+          <a:p>
+            <a:r>
+              <a:rPr lang="en-US" dirty="0" smtClean="0"/>
+              <a:t>Ground station has </a:t>
+            </a:r>
+            <a:r>
+              <a:rPr lang="en-US" dirty="0" err="1" smtClean="0"/>
+              <a:t>bluetooth</a:t>
+            </a:r>
+            <a:r>
+              <a:rPr lang="en-US" dirty="0" smtClean="0"/>
+              <a:t> and transmitter</a:t>
+            </a:r>
+          </a:p>
+          <a:p>
+            <a:pPr lvl="1"/>
+            <a:r>
+              <a:rPr lang="en-US" dirty="0" smtClean="0"/>
+              <a:t>Future: use as RC transmitter also</a:t>
+            </a:r>
+          </a:p>
+          <a:p>
+            <a:r>
+              <a:rPr lang="en-US" dirty="0" smtClean="0"/>
+              <a:t>Computer/iPhone app connects to ground station through </a:t>
+            </a:r>
+            <a:r>
+              <a:rPr lang="en-US" dirty="0" err="1" smtClean="0"/>
+              <a:t>bluetooth</a:t>
+            </a:r>
+            <a:r>
+              <a:rPr lang="en-US" smtClean="0"/>
+              <a:t>.</a:t>
+            </a:r>
+            <a:endParaRPr lang="en-US" dirty="0" smtClean="0"/>
           </a:p>
           <a:p>
             <a:endParaRPr lang="en-US" dirty="0"/>
@@ -32879,7 +33354,7 @@
     </p:spTree>
     <p:extLst>
       <p:ext uri="{BB962C8B-B14F-4D97-AF65-F5344CB8AC3E}">
-        <p14:creationId xmlns:p14="http://schemas.microsoft.com/office/powerpoint/2010/main" val="1234539895"/>
+        <p14:creationId xmlns:p14="http://schemas.microsoft.com/office/powerpoint/2010/main" val="891112083"/>
       </p:ext>
     </p:extLst>
   </p:cSld>
@@ -32922,8 +33397,12 @@
           <a:lstStyle/>
           <a:p>
             <a:r>
-              <a:rPr lang="en-US" dirty="0" smtClean="0"/>
-              <a:t>Teensy 4.0 SPI</a:t>
+              <a:rPr lang="en-US" dirty="0" err="1" smtClean="0"/>
+              <a:t>Arduino</a:t>
+            </a:r>
+            <a:r>
+              <a:rPr lang="en-US" dirty="0" smtClean="0"/>
+              <a:t> Nano SPI</a:t>
             </a:r>
             <a:endParaRPr lang="en-US" dirty="0"/>
           </a:p>
@@ -32995,6 +33474,148 @@
               <a:t>–</a:t>
             </a:r>
             <a:r>
+              <a:rPr lang="en-US" dirty="0" smtClean="0"/>
+              <a:t> 9</a:t>
+            </a:r>
+          </a:p>
+          <a:p>
+            <a:r>
+              <a:rPr lang="en-US" dirty="0" smtClean="0"/>
+              <a:t>CSN </a:t>
+            </a:r>
+            <a:r>
+              <a:rPr lang="mr-IN" dirty="0" smtClean="0"/>
+              <a:t>–</a:t>
+            </a:r>
+            <a:r>
+              <a:rPr lang="en-US" dirty="0" smtClean="0"/>
+              <a:t> 10</a:t>
+            </a:r>
+          </a:p>
+          <a:p>
+            <a:endParaRPr lang="en-US" dirty="0"/>
+          </a:p>
+        </p:txBody>
+      </p:sp>
+    </p:spTree>
+    <p:extLst>
+      <p:ext uri="{BB962C8B-B14F-4D97-AF65-F5344CB8AC3E}">
+        <p14:creationId xmlns:p14="http://schemas.microsoft.com/office/powerpoint/2010/main" val="1234539895"/>
+      </p:ext>
+    </p:extLst>
+  </p:cSld>
+  <p:clrMapOvr>
+    <a:masterClrMapping/>
+  </p:clrMapOvr>
+</p:sld>
+</file>
+
+<file path=ppt/slides/slide56.xml><?xml version="1.0" encoding="utf-8"?>
+<p:sld xmlns:a="http://schemas.openxmlformats.org/drawingml/2006/main" xmlns:r="http://schemas.openxmlformats.org/officeDocument/2006/relationships" xmlns:p="http://schemas.openxmlformats.org/presentationml/2006/main">
+  <p:cSld>
+    <p:spTree>
+      <p:nvGrpSpPr>
+        <p:cNvPr id="1" name=""/>
+        <p:cNvGrpSpPr/>
+        <p:nvPr/>
+      </p:nvGrpSpPr>
+      <p:grpSpPr>
+        <a:xfrm>
+          <a:off x="0" y="0"/>
+          <a:ext cx="0" cy="0"/>
+          <a:chOff x="0" y="0"/>
+          <a:chExt cx="0" cy="0"/>
+        </a:xfrm>
+      </p:grpSpPr>
+      <p:sp>
+        <p:nvSpPr>
+          <p:cNvPr id="2" name="Title 1"/>
+          <p:cNvSpPr>
+            <a:spLocks noGrp="1"/>
+          </p:cNvSpPr>
+          <p:nvPr>
+            <p:ph type="title"/>
+          </p:nvPr>
+        </p:nvSpPr>
+        <p:spPr/>
+        <p:txBody>
+          <a:bodyPr/>
+          <a:lstStyle/>
+          <a:p>
+            <a:r>
+              <a:rPr lang="en-US" dirty="0" smtClean="0"/>
+              <a:t>Teensy 4.0 SPI</a:t>
+            </a:r>
+            <a:endParaRPr lang="en-US" dirty="0"/>
+          </a:p>
+        </p:txBody>
+      </p:sp>
+      <p:sp>
+        <p:nvSpPr>
+          <p:cNvPr id="3" name="Content Placeholder 2"/>
+          <p:cNvSpPr>
+            <a:spLocks noGrp="1"/>
+          </p:cNvSpPr>
+          <p:nvPr>
+            <p:ph idx="1"/>
+          </p:nvPr>
+        </p:nvSpPr>
+        <p:spPr/>
+        <p:txBody>
+          <a:bodyPr/>
+          <a:lstStyle/>
+          <a:p>
+            <a:r>
+              <a:rPr lang="en-US" dirty="0" smtClean="0"/>
+              <a:t>MISO </a:t>
+            </a:r>
+            <a:r>
+              <a:rPr lang="mr-IN" dirty="0" smtClean="0"/>
+              <a:t>–</a:t>
+            </a:r>
+            <a:r>
+              <a:rPr lang="en-US" dirty="0" smtClean="0"/>
+              <a:t> 12</a:t>
+            </a:r>
+          </a:p>
+          <a:p>
+            <a:r>
+              <a:rPr lang="en-US" dirty="0" smtClean="0"/>
+              <a:t>MOSI </a:t>
+            </a:r>
+            <a:r>
+              <a:rPr lang="mr-IN" dirty="0" smtClean="0"/>
+              <a:t>–</a:t>
+            </a:r>
+            <a:r>
+              <a:rPr lang="en-US" dirty="0" smtClean="0"/>
+              <a:t> 11</a:t>
+            </a:r>
+          </a:p>
+          <a:p>
+            <a:r>
+              <a:rPr lang="en-US" dirty="0" smtClean="0"/>
+              <a:t>SCK </a:t>
+            </a:r>
+            <a:r>
+              <a:rPr lang="mr-IN" dirty="0" smtClean="0"/>
+              <a:t>–</a:t>
+            </a:r>
+            <a:r>
+              <a:rPr lang="en-US" dirty="0" smtClean="0"/>
+              <a:t> 13</a:t>
+            </a:r>
+          </a:p>
+          <a:p>
+            <a:r>
+              <a:rPr lang="en-US" dirty="0" smtClean="0"/>
+              <a:t>CE </a:t>
+            </a:r>
+            <a:r>
+              <a:rPr lang="mr-IN" dirty="0" smtClean="0"/>
+              <a:t>–</a:t>
+            </a:r>
+            <a:r>
               <a:rPr lang="en-US" smtClean="0"/>
               <a:t>  (4)</a:t>
             </a:r>
@@ -33023,6 +33644,242 @@
     <p:extLst>
       <p:ext uri="{BB962C8B-B14F-4D97-AF65-F5344CB8AC3E}">
         <p14:creationId xmlns:p14="http://schemas.microsoft.com/office/powerpoint/2010/main" val="3389540702"/>
+      </p:ext>
+    </p:extLst>
+  </p:cSld>
+  <p:clrMapOvr>
+    <a:masterClrMapping/>
+  </p:clrMapOvr>
+</p:sld>
+</file>
+
+<file path=ppt/slides/slide57.xml><?xml version="1.0" encoding="utf-8"?>
+<p:sld xmlns:a="http://schemas.openxmlformats.org/drawingml/2006/main" xmlns:r="http://schemas.openxmlformats.org/officeDocument/2006/relationships" xmlns:p="http://schemas.openxmlformats.org/presentationml/2006/main">
+  <p:cSld>
+    <p:spTree>
+      <p:nvGrpSpPr>
+        <p:cNvPr id="1" name=""/>
+        <p:cNvGrpSpPr/>
+        <p:nvPr/>
+      </p:nvGrpSpPr>
+      <p:grpSpPr>
+        <a:xfrm>
+          <a:off x="0" y="0"/>
+          <a:ext cx="0" cy="0"/>
+          <a:chOff x="0" y="0"/>
+          <a:chExt cx="0" cy="0"/>
+        </a:xfrm>
+      </p:grpSpPr>
+      <p:sp>
+        <p:nvSpPr>
+          <p:cNvPr id="2" name="Title 1"/>
+          <p:cNvSpPr>
+            <a:spLocks noGrp="1"/>
+          </p:cNvSpPr>
+          <p:nvPr>
+            <p:ph type="title"/>
+          </p:nvPr>
+        </p:nvSpPr>
+        <p:spPr/>
+        <p:txBody>
+          <a:bodyPr/>
+          <a:lstStyle/>
+          <a:p>
+            <a:r>
+              <a:rPr lang="en-US" dirty="0" smtClean="0"/>
+              <a:t>Debugging APC220 - Teensy</a:t>
+            </a:r>
+            <a:endParaRPr lang="en-US" dirty="0"/>
+          </a:p>
+        </p:txBody>
+      </p:sp>
+      <p:sp>
+        <p:nvSpPr>
+          <p:cNvPr id="3" name="Content Placeholder 2"/>
+          <p:cNvSpPr>
+            <a:spLocks noGrp="1"/>
+          </p:cNvSpPr>
+          <p:nvPr>
+            <p:ph idx="1"/>
+          </p:nvPr>
+        </p:nvSpPr>
+        <p:spPr/>
+        <p:txBody>
+          <a:bodyPr>
+            <a:normAutofit fontScale="55000" lnSpcReduction="20000"/>
+          </a:bodyPr>
+          <a:lstStyle/>
+          <a:p>
+            <a:r>
+              <a:rPr lang="en-US" dirty="0" smtClean="0"/>
+              <a:t>Not enough power from battery through 3.3V regulator for </a:t>
+            </a:r>
+            <a:r>
+              <a:rPr lang="en-US" dirty="0" err="1" smtClean="0"/>
+              <a:t>IMU,Baro,GPS</a:t>
+            </a:r>
+            <a:r>
+              <a:rPr lang="en-US" dirty="0" smtClean="0"/>
+              <a:t>,</a:t>
+            </a:r>
+            <a:r>
+              <a:rPr lang="en-US" dirty="0"/>
+              <a:t> </a:t>
+            </a:r>
+            <a:r>
+              <a:rPr lang="en-US" dirty="0" smtClean="0"/>
+              <a:t>and APC220.</a:t>
+            </a:r>
+          </a:p>
+          <a:p>
+            <a:pPr lvl="1"/>
+            <a:r>
+              <a:rPr lang="en-US" dirty="0" smtClean="0"/>
+              <a:t>Just connecting GPS and APC220 for now</a:t>
+            </a:r>
+          </a:p>
+          <a:p>
+            <a:pPr lvl="1"/>
+            <a:r>
+              <a:rPr lang="en-US" dirty="0" smtClean="0"/>
+              <a:t>Reset voltage regulator</a:t>
+            </a:r>
+          </a:p>
+          <a:p>
+            <a:r>
+              <a:rPr lang="en-US" dirty="0" smtClean="0"/>
+              <a:t>Testing Enable from teensy</a:t>
+            </a:r>
+          </a:p>
+          <a:p>
+            <a:pPr lvl="1"/>
+            <a:r>
+              <a:rPr lang="en-US" dirty="0" smtClean="0"/>
+              <a:t>Enable pin works. Setting to Sleep results in no response</a:t>
+            </a:r>
+          </a:p>
+          <a:p>
+            <a:r>
+              <a:rPr lang="en-US" dirty="0" smtClean="0"/>
+              <a:t>Testing Set from teensy</a:t>
+            </a:r>
+          </a:p>
+          <a:p>
+            <a:pPr lvl="1"/>
+            <a:r>
+              <a:rPr lang="en-US" dirty="0" smtClean="0"/>
+              <a:t>Automatic timeout after 5s</a:t>
+            </a:r>
+          </a:p>
+          <a:p>
+            <a:pPr lvl="1"/>
+            <a:r>
+              <a:rPr lang="en-US" dirty="0" smtClean="0"/>
+              <a:t>Set pin works</a:t>
+            </a:r>
+          </a:p>
+          <a:p>
+            <a:r>
+              <a:rPr lang="en-US" dirty="0" smtClean="0"/>
+              <a:t>Test RX pin on Teensy</a:t>
+            </a:r>
+          </a:p>
+          <a:p>
+            <a:pPr lvl="1"/>
+            <a:r>
+              <a:rPr lang="en-US" dirty="0" smtClean="0"/>
+              <a:t>Able to receive through </a:t>
+            </a:r>
+            <a:r>
+              <a:rPr lang="en-US" dirty="0" err="1" smtClean="0"/>
+              <a:t>tmIO</a:t>
+            </a:r>
+            <a:endParaRPr lang="en-US" dirty="0" smtClean="0"/>
+          </a:p>
+          <a:p>
+            <a:pPr lvl="1"/>
+            <a:r>
+              <a:rPr lang="en-US" dirty="0" smtClean="0"/>
+              <a:t>Able to receive through </a:t>
+            </a:r>
+            <a:r>
+              <a:rPr lang="en-US" dirty="0" err="1" smtClean="0"/>
+              <a:t>telemetryFIFO</a:t>
+            </a:r>
+            <a:endParaRPr lang="en-US" dirty="0" smtClean="0"/>
+          </a:p>
+          <a:p>
+            <a:r>
+              <a:rPr lang="en-US" dirty="0" smtClean="0"/>
+              <a:t>Test TX pin on Teensy</a:t>
+            </a:r>
+          </a:p>
+          <a:p>
+            <a:pPr lvl="1"/>
+            <a:r>
+              <a:rPr lang="en-US" dirty="0" smtClean="0"/>
+              <a:t>Write works, Nano receives a response</a:t>
+            </a:r>
+          </a:p>
+          <a:p>
+            <a:pPr lvl="1"/>
+            <a:r>
+              <a:rPr lang="en-US" dirty="0" smtClean="0"/>
+              <a:t>Something wrong with read/write together. Nano confirms full </a:t>
+            </a:r>
+            <a:r>
+              <a:rPr lang="en-US" dirty="0" err="1" smtClean="0"/>
+              <a:t>msg</a:t>
+            </a:r>
+            <a:r>
+              <a:rPr lang="en-US" dirty="0" smtClean="0"/>
+              <a:t> is received, Teensy only sees first 2-4 bytes. FIFO problem?</a:t>
+            </a:r>
+          </a:p>
+          <a:p>
+            <a:pPr lvl="1"/>
+            <a:r>
+              <a:rPr lang="en-US" dirty="0" smtClean="0"/>
+              <a:t>Write through </a:t>
+            </a:r>
+            <a:r>
+              <a:rPr lang="en-US" dirty="0" err="1" smtClean="0"/>
+              <a:t>tmIO</a:t>
+            </a:r>
+            <a:r>
+              <a:rPr lang="en-US" dirty="0" smtClean="0"/>
+              <a:t>, read through FIFO is GOOD. write from FIFO read from </a:t>
+            </a:r>
+            <a:r>
+              <a:rPr lang="en-US" dirty="0" err="1" smtClean="0"/>
+              <a:t>tmIO</a:t>
+            </a:r>
+            <a:r>
+              <a:rPr lang="en-US" dirty="0" smtClean="0"/>
+              <a:t>/FIFO is BAD</a:t>
+            </a:r>
+          </a:p>
+          <a:p>
+            <a:pPr lvl="1"/>
+            <a:r>
+              <a:rPr lang="en-US" dirty="0" smtClean="0"/>
+              <a:t>Move to 200hz, consistent </a:t>
+            </a:r>
+            <a:r>
+              <a:rPr lang="en-US" smtClean="0"/>
+              <a:t>good results!</a:t>
+            </a:r>
+            <a:endParaRPr lang="en-US" dirty="0" smtClean="0"/>
+          </a:p>
+          <a:p>
+            <a:endParaRPr lang="en-US" dirty="0" smtClean="0"/>
+          </a:p>
+        </p:txBody>
+      </p:sp>
+    </p:spTree>
+    <p:extLst>
+      <p:ext uri="{BB962C8B-B14F-4D97-AF65-F5344CB8AC3E}">
+        <p14:creationId xmlns:p14="http://schemas.microsoft.com/office/powerpoint/2010/main" val="2745854731"/>
       </p:ext>
     </p:extLst>
   </p:cSld>

</xml_diff>